<commit_message>
added parsing support for underlined paragraphs
</commit_message>
<xml_diff>
--- a/PowerPointParser/PowerPointParserTests/TestData/TestFour.pptx
+++ b/PowerPointParser/PowerPointParserTests/TestData/TestFour.pptx
@@ -108,6 +108,11 @@
       </a:defRPr>
     </a:lvl9pPr>
   </p:defaultTextStyle>
+  <p:extLst>
+    <p:ext uri="{EFAFB233-063F-42B5-8137-9DF3F51BA10A}">
+      <p15:sldGuideLst xmlns:p15="http://schemas.microsoft.com/office/powerpoint/2012/main"/>
+    </p:ext>
+  </p:extLst>
 </p:presentation>
 </file>
 
@@ -193,7 +198,7 @@
           <a:p>
             <a:fld id="{97505CB1-976E-4E09-9037-91E1052A565F}" type="datetimeFigureOut">
               <a:rPr lang="en-US" smtClean="0"/>
-              <a:t>3/27/2022</a:t>
+              <a:t>3/29/2022</a:t>
             </a:fld>
             <a:endParaRPr lang="en-US"/>
           </a:p>
@@ -608,7 +613,10 @@
           <a:bodyPr/>
           <a:lstStyle/>
           <a:p>
-            <a:endParaRPr lang="en-US" i="1" dirty="0"/>
+            <a:r>
+              <a:rPr lang="en-US" u="sng" dirty="0"/>
+              <a:t>This is underlined</a:t>
+            </a:r>
           </a:p>
         </p:txBody>
       </p:sp>
@@ -638,7 +646,7 @@
     </p:spTree>
     <p:extLst>
       <p:ext uri="{BB962C8B-B14F-4D97-AF65-F5344CB8AC3E}">
-        <p14:creationId xmlns:p14="http://schemas.microsoft.com/office/powerpoint/2010/main" val="397085616"/>
+        <p14:creationId xmlns:p14="http://schemas.microsoft.com/office/powerpoint/2010/main" val="3325171022"/>
       </p:ext>
     </p:extLst>
   </p:cSld>
@@ -795,7 +803,7 @@
           <a:p>
             <a:fld id="{70F22B0E-A09D-47A1-955C-36AA0FA442C5}" type="datetimeFigureOut">
               <a:rPr lang="en-US" smtClean="0"/>
-              <a:t>3/27/2022</a:t>
+              <a:t>3/29/2022</a:t>
             </a:fld>
             <a:endParaRPr lang="en-US"/>
           </a:p>
@@ -993,7 +1001,7 @@
           <a:p>
             <a:fld id="{70F22B0E-A09D-47A1-955C-36AA0FA442C5}" type="datetimeFigureOut">
               <a:rPr lang="en-US" smtClean="0"/>
-              <a:t>3/27/2022</a:t>
+              <a:t>3/29/2022</a:t>
             </a:fld>
             <a:endParaRPr lang="en-US"/>
           </a:p>
@@ -1201,7 +1209,7 @@
           <a:p>
             <a:fld id="{70F22B0E-A09D-47A1-955C-36AA0FA442C5}" type="datetimeFigureOut">
               <a:rPr lang="en-US" smtClean="0"/>
-              <a:t>3/27/2022</a:t>
+              <a:t>3/29/2022</a:t>
             </a:fld>
             <a:endParaRPr lang="en-US"/>
           </a:p>
@@ -1399,7 +1407,7 @@
           <a:p>
             <a:fld id="{70F22B0E-A09D-47A1-955C-36AA0FA442C5}" type="datetimeFigureOut">
               <a:rPr lang="en-US" smtClean="0"/>
-              <a:t>3/27/2022</a:t>
+              <a:t>3/29/2022</a:t>
             </a:fld>
             <a:endParaRPr lang="en-US"/>
           </a:p>
@@ -1674,7 +1682,7 @@
           <a:p>
             <a:fld id="{70F22B0E-A09D-47A1-955C-36AA0FA442C5}" type="datetimeFigureOut">
               <a:rPr lang="en-US" smtClean="0"/>
-              <a:t>3/27/2022</a:t>
+              <a:t>3/29/2022</a:t>
             </a:fld>
             <a:endParaRPr lang="en-US"/>
           </a:p>
@@ -1939,7 +1947,7 @@
           <a:p>
             <a:fld id="{70F22B0E-A09D-47A1-955C-36AA0FA442C5}" type="datetimeFigureOut">
               <a:rPr lang="en-US" smtClean="0"/>
-              <a:t>3/27/2022</a:t>
+              <a:t>3/29/2022</a:t>
             </a:fld>
             <a:endParaRPr lang="en-US"/>
           </a:p>
@@ -2351,7 +2359,7 @@
           <a:p>
             <a:fld id="{70F22B0E-A09D-47A1-955C-36AA0FA442C5}" type="datetimeFigureOut">
               <a:rPr lang="en-US" smtClean="0"/>
-              <a:t>3/27/2022</a:t>
+              <a:t>3/29/2022</a:t>
             </a:fld>
             <a:endParaRPr lang="en-US"/>
           </a:p>
@@ -2492,7 +2500,7 @@
           <a:p>
             <a:fld id="{70F22B0E-A09D-47A1-955C-36AA0FA442C5}" type="datetimeFigureOut">
               <a:rPr lang="en-US" smtClean="0"/>
-              <a:t>3/27/2022</a:t>
+              <a:t>3/29/2022</a:t>
             </a:fld>
             <a:endParaRPr lang="en-US"/>
           </a:p>
@@ -2605,7 +2613,7 @@
           <a:p>
             <a:fld id="{70F22B0E-A09D-47A1-955C-36AA0FA442C5}" type="datetimeFigureOut">
               <a:rPr lang="en-US" smtClean="0"/>
-              <a:t>3/27/2022</a:t>
+              <a:t>3/29/2022</a:t>
             </a:fld>
             <a:endParaRPr lang="en-US"/>
           </a:p>
@@ -2916,7 +2924,7 @@
           <a:p>
             <a:fld id="{70F22B0E-A09D-47A1-955C-36AA0FA442C5}" type="datetimeFigureOut">
               <a:rPr lang="en-US" smtClean="0"/>
-              <a:t>3/27/2022</a:t>
+              <a:t>3/29/2022</a:t>
             </a:fld>
             <a:endParaRPr lang="en-US"/>
           </a:p>
@@ -3204,7 +3212,7 @@
           <a:p>
             <a:fld id="{70F22B0E-A09D-47A1-955C-36AA0FA442C5}" type="datetimeFigureOut">
               <a:rPr lang="en-US" smtClean="0"/>
-              <a:t>3/27/2022</a:t>
+              <a:t>3/29/2022</a:t>
             </a:fld>
             <a:endParaRPr lang="en-US"/>
           </a:p>
@@ -3445,7 +3453,7 @@
           <a:p>
             <a:fld id="{70F22B0E-A09D-47A1-955C-36AA0FA442C5}" type="datetimeFigureOut">
               <a:rPr lang="en-US" smtClean="0"/>
-              <a:t>3/27/2022</a:t>
+              <a:t>3/29/2022</a:t>
             </a:fld>
             <a:endParaRPr lang="en-US"/>
           </a:p>
@@ -3947,7 +3955,7 @@
           <p:cNvPr id="2" name="Title 1">
             <a:extLst>
               <a:ext uri="{FF2B5EF4-FFF2-40B4-BE49-F238E27FC236}">
-                <a16:creationId xmlns:a16="http://schemas.microsoft.com/office/drawing/2014/main" id="{F53D0E64-C17E-4F30-9F45-D9CBE4797929}"/>
+                <a16:creationId xmlns:a16="http://schemas.microsoft.com/office/drawing/2014/main" id="{7C2F93DB-AD43-485D-B6A9-2C020F7E0605}"/>
               </a:ext>
             </a:extLst>
           </p:cNvPr>
@@ -3972,7 +3980,7 @@
           <p:cNvPr id="3" name="Content Placeholder 2">
             <a:extLst>
               <a:ext uri="{FF2B5EF4-FFF2-40B4-BE49-F238E27FC236}">
-                <a16:creationId xmlns:a16="http://schemas.microsoft.com/office/drawing/2014/main" id="{D99EFD4B-DFE5-4B22-86D8-0D31A87A32F6}"/>
+                <a16:creationId xmlns:a16="http://schemas.microsoft.com/office/drawing/2014/main" id="{7831D505-DA8E-452E-8414-7FF818DFF5B2}"/>
               </a:ext>
             </a:extLst>
           </p:cNvPr>
@@ -3995,7 +4003,7 @@
     </p:spTree>
     <p:extLst>
       <p:ext uri="{BB962C8B-B14F-4D97-AF65-F5344CB8AC3E}">
-        <p14:creationId xmlns:p14="http://schemas.microsoft.com/office/powerpoint/2010/main" val="2826674774"/>
+        <p14:creationId xmlns:p14="http://schemas.microsoft.com/office/powerpoint/2010/main" val="4044810432"/>
       </p:ext>
     </p:extLst>
   </p:cSld>

</xml_diff>

<commit_message>
added support for strikethrough and underlined, refactored html generation
</commit_message>
<xml_diff>
--- a/PowerPointParser/PowerPointParserTests/TestData/TestFour.pptx
+++ b/PowerPointParser/PowerPointParserTests/TestData/TestFour.pptx
@@ -5,11 +5,15 @@
     <p:sldMasterId id="2147483648" r:id="rId1"/>
   </p:sldMasterIdLst>
   <p:notesMasterIdLst>
-    <p:notesMasterId r:id="rId4"/>
+    <p:notesMasterId r:id="rId8"/>
   </p:notesMasterIdLst>
   <p:sldIdLst>
     <p:sldId id="256" r:id="rId2"/>
     <p:sldId id="257" r:id="rId3"/>
+    <p:sldId id="258" r:id="rId4"/>
+    <p:sldId id="259" r:id="rId5"/>
+    <p:sldId id="260" r:id="rId6"/>
+    <p:sldId id="261" r:id="rId7"/>
   </p:sldIdLst>
   <p:sldSz cx="12192000" cy="6858000"/>
   <p:notesSz cx="6858000" cy="9144000"/>
@@ -198,7 +202,7 @@
           <a:p>
             <a:fld id="{97505CB1-976E-4E09-9037-91E1052A565F}" type="datetimeFigureOut">
               <a:rPr lang="en-US" smtClean="0"/>
-              <a:t>3/29/2022</a:t>
+              <a:t>3/30/2022</a:t>
             </a:fld>
             <a:endParaRPr lang="en-US"/>
           </a:p>
@@ -656,6 +660,375 @@
 </p:notes>
 </file>
 
+<file path=ppt/notesSlides/notesSlide3.xml><?xml version="1.0" encoding="utf-8"?>
+<p:notes xmlns:a="http://schemas.openxmlformats.org/drawingml/2006/main" xmlns:r="http://schemas.openxmlformats.org/officeDocument/2006/relationships" xmlns:p="http://schemas.openxmlformats.org/presentationml/2006/main">
+  <p:cSld>
+    <p:spTree>
+      <p:nvGrpSpPr>
+        <p:cNvPr id="1" name=""/>
+        <p:cNvGrpSpPr/>
+        <p:nvPr/>
+      </p:nvGrpSpPr>
+      <p:grpSpPr>
+        <a:xfrm>
+          <a:off x="0" y="0"/>
+          <a:ext cx="0" cy="0"/>
+          <a:chOff x="0" y="0"/>
+          <a:chExt cx="0" cy="0"/>
+        </a:xfrm>
+      </p:grpSpPr>
+      <p:sp>
+        <p:nvSpPr>
+          <p:cNvPr id="2" name="Slide Image Placeholder 1"/>
+          <p:cNvSpPr>
+            <a:spLocks noGrp="1" noRot="1" noChangeAspect="1"/>
+          </p:cNvSpPr>
+          <p:nvPr>
+            <p:ph type="sldImg"/>
+          </p:nvPr>
+        </p:nvSpPr>
+        <p:spPr/>
+      </p:sp>
+      <p:sp>
+        <p:nvSpPr>
+          <p:cNvPr id="3" name="Notes Placeholder 2"/>
+          <p:cNvSpPr>
+            <a:spLocks noGrp="1"/>
+          </p:cNvSpPr>
+          <p:nvPr>
+            <p:ph type="body" idx="1"/>
+          </p:nvPr>
+        </p:nvSpPr>
+        <p:spPr/>
+        <p:txBody>
+          <a:bodyPr/>
+          <a:lstStyle/>
+          <a:p>
+            <a:r>
+              <a:rPr lang="en-US" strike="sngStrike" dirty="0"/>
+              <a:t>This text has a strike through</a:t>
+            </a:r>
+          </a:p>
+        </p:txBody>
+      </p:sp>
+      <p:sp>
+        <p:nvSpPr>
+          <p:cNvPr id="4" name="Slide Number Placeholder 3"/>
+          <p:cNvSpPr>
+            <a:spLocks noGrp="1"/>
+          </p:cNvSpPr>
+          <p:nvPr>
+            <p:ph type="sldNum" sz="quarter" idx="5"/>
+          </p:nvPr>
+        </p:nvSpPr>
+        <p:spPr/>
+        <p:txBody>
+          <a:bodyPr/>
+          <a:lstStyle/>
+          <a:p>
+            <a:fld id="{C50D177A-D6FC-4D39-8CFD-20F2CFDFE6A8}" type="slidenum">
+              <a:rPr lang="en-US" smtClean="0"/>
+              <a:t>3</a:t>
+            </a:fld>
+            <a:endParaRPr lang="en-US"/>
+          </a:p>
+        </p:txBody>
+      </p:sp>
+    </p:spTree>
+    <p:extLst>
+      <p:ext uri="{BB962C8B-B14F-4D97-AF65-F5344CB8AC3E}">
+        <p14:creationId xmlns:p14="http://schemas.microsoft.com/office/powerpoint/2010/main" val="2476751641"/>
+      </p:ext>
+    </p:extLst>
+  </p:cSld>
+  <p:clrMapOvr>
+    <a:masterClrMapping/>
+  </p:clrMapOvr>
+</p:notes>
+</file>
+
+<file path=ppt/notesSlides/notesSlide4.xml><?xml version="1.0" encoding="utf-8"?>
+<p:notes xmlns:a="http://schemas.openxmlformats.org/drawingml/2006/main" xmlns:r="http://schemas.openxmlformats.org/officeDocument/2006/relationships" xmlns:p="http://schemas.openxmlformats.org/presentationml/2006/main">
+  <p:cSld>
+    <p:spTree>
+      <p:nvGrpSpPr>
+        <p:cNvPr id="1" name=""/>
+        <p:cNvGrpSpPr/>
+        <p:nvPr/>
+      </p:nvGrpSpPr>
+      <p:grpSpPr>
+        <a:xfrm>
+          <a:off x="0" y="0"/>
+          <a:ext cx="0" cy="0"/>
+          <a:chOff x="0" y="0"/>
+          <a:chExt cx="0" cy="0"/>
+        </a:xfrm>
+      </p:grpSpPr>
+      <p:sp>
+        <p:nvSpPr>
+          <p:cNvPr id="2" name="Slide Image Placeholder 1"/>
+          <p:cNvSpPr>
+            <a:spLocks noGrp="1" noRot="1" noChangeAspect="1"/>
+          </p:cNvSpPr>
+          <p:nvPr>
+            <p:ph type="sldImg"/>
+          </p:nvPr>
+        </p:nvSpPr>
+        <p:spPr/>
+      </p:sp>
+      <p:sp>
+        <p:nvSpPr>
+          <p:cNvPr id="3" name="Notes Placeholder 2"/>
+          <p:cNvSpPr>
+            <a:spLocks noGrp="1"/>
+          </p:cNvSpPr>
+          <p:nvPr>
+            <p:ph type="body" idx="1"/>
+          </p:nvPr>
+        </p:nvSpPr>
+        <p:spPr/>
+        <p:txBody>
+          <a:bodyPr/>
+          <a:lstStyle/>
+          <a:p>
+            <a:pPr algn="ctr"/>
+            <a:r>
+              <a:rPr lang="en-US" sz="1800" dirty="0">
+                <a:solidFill>
+                  <a:srgbClr val="A31515"/>
+                </a:solidFill>
+                <a:latin typeface="Cascadia Mono" panose="020B0609020000020004" pitchFamily="49" charset="0"/>
+              </a:rPr>
+              <a:t>This text is center aligned</a:t>
+            </a:r>
+            <a:endParaRPr lang="en-US" dirty="0"/>
+          </a:p>
+        </p:txBody>
+      </p:sp>
+      <p:sp>
+        <p:nvSpPr>
+          <p:cNvPr id="4" name="Slide Number Placeholder 3"/>
+          <p:cNvSpPr>
+            <a:spLocks noGrp="1"/>
+          </p:cNvSpPr>
+          <p:nvPr>
+            <p:ph type="sldNum" sz="quarter" idx="5"/>
+          </p:nvPr>
+        </p:nvSpPr>
+        <p:spPr/>
+        <p:txBody>
+          <a:bodyPr/>
+          <a:lstStyle/>
+          <a:p>
+            <a:fld id="{C50D177A-D6FC-4D39-8CFD-20F2CFDFE6A8}" type="slidenum">
+              <a:rPr lang="en-US" smtClean="0"/>
+              <a:t>4</a:t>
+            </a:fld>
+            <a:endParaRPr lang="en-US"/>
+          </a:p>
+        </p:txBody>
+      </p:sp>
+    </p:spTree>
+    <p:extLst>
+      <p:ext uri="{BB962C8B-B14F-4D97-AF65-F5344CB8AC3E}">
+        <p14:creationId xmlns:p14="http://schemas.microsoft.com/office/powerpoint/2010/main" val="1160020683"/>
+      </p:ext>
+    </p:extLst>
+  </p:cSld>
+  <p:clrMapOvr>
+    <a:masterClrMapping/>
+  </p:clrMapOvr>
+</p:notes>
+</file>
+
+<file path=ppt/notesSlides/notesSlide5.xml><?xml version="1.0" encoding="utf-8"?>
+<p:notes xmlns:a="http://schemas.openxmlformats.org/drawingml/2006/main" xmlns:r="http://schemas.openxmlformats.org/officeDocument/2006/relationships" xmlns:p="http://schemas.openxmlformats.org/presentationml/2006/main">
+  <p:cSld>
+    <p:spTree>
+      <p:nvGrpSpPr>
+        <p:cNvPr id="1" name=""/>
+        <p:cNvGrpSpPr/>
+        <p:nvPr/>
+      </p:nvGrpSpPr>
+      <p:grpSpPr>
+        <a:xfrm>
+          <a:off x="0" y="0"/>
+          <a:ext cx="0" cy="0"/>
+          <a:chOff x="0" y="0"/>
+          <a:chExt cx="0" cy="0"/>
+        </a:xfrm>
+      </p:grpSpPr>
+      <p:sp>
+        <p:nvSpPr>
+          <p:cNvPr id="2" name="Slide Image Placeholder 1"/>
+          <p:cNvSpPr>
+            <a:spLocks noGrp="1" noRot="1" noChangeAspect="1"/>
+          </p:cNvSpPr>
+          <p:nvPr>
+            <p:ph type="sldImg"/>
+          </p:nvPr>
+        </p:nvSpPr>
+        <p:spPr/>
+      </p:sp>
+      <p:sp>
+        <p:nvSpPr>
+          <p:cNvPr id="3" name="Notes Placeholder 2"/>
+          <p:cNvSpPr>
+            <a:spLocks noGrp="1"/>
+          </p:cNvSpPr>
+          <p:nvPr>
+            <p:ph type="body" idx="1"/>
+          </p:nvPr>
+        </p:nvSpPr>
+        <p:spPr/>
+        <p:txBody>
+          <a:bodyPr/>
+          <a:lstStyle/>
+          <a:p>
+            <a:pPr algn="r"/>
+            <a:r>
+              <a:rPr lang="en-US" sz="1800" dirty="0">
+                <a:solidFill>
+                  <a:srgbClr val="A31515"/>
+                </a:solidFill>
+                <a:latin typeface="Cascadia Mono" panose="020B0609020000020004" pitchFamily="49" charset="0"/>
+              </a:rPr>
+              <a:t>This text is right aligned</a:t>
+            </a:r>
+            <a:endParaRPr lang="en-US" dirty="0"/>
+          </a:p>
+        </p:txBody>
+      </p:sp>
+      <p:sp>
+        <p:nvSpPr>
+          <p:cNvPr id="4" name="Slide Number Placeholder 3"/>
+          <p:cNvSpPr>
+            <a:spLocks noGrp="1"/>
+          </p:cNvSpPr>
+          <p:nvPr>
+            <p:ph type="sldNum" sz="quarter" idx="5"/>
+          </p:nvPr>
+        </p:nvSpPr>
+        <p:spPr/>
+        <p:txBody>
+          <a:bodyPr/>
+          <a:lstStyle/>
+          <a:p>
+            <a:fld id="{C50D177A-D6FC-4D39-8CFD-20F2CFDFE6A8}" type="slidenum">
+              <a:rPr lang="en-US" smtClean="0"/>
+              <a:t>5</a:t>
+            </a:fld>
+            <a:endParaRPr lang="en-US"/>
+          </a:p>
+        </p:txBody>
+      </p:sp>
+    </p:spTree>
+    <p:extLst>
+      <p:ext uri="{BB962C8B-B14F-4D97-AF65-F5344CB8AC3E}">
+        <p14:creationId xmlns:p14="http://schemas.microsoft.com/office/powerpoint/2010/main" val="1607824635"/>
+      </p:ext>
+    </p:extLst>
+  </p:cSld>
+  <p:clrMapOvr>
+    <a:masterClrMapping/>
+  </p:clrMapOvr>
+</p:notes>
+</file>
+
+<file path=ppt/notesSlides/notesSlide6.xml><?xml version="1.0" encoding="utf-8"?>
+<p:notes xmlns:a="http://schemas.openxmlformats.org/drawingml/2006/main" xmlns:r="http://schemas.openxmlformats.org/officeDocument/2006/relationships" xmlns:p="http://schemas.openxmlformats.org/presentationml/2006/main">
+  <p:cSld>
+    <p:spTree>
+      <p:nvGrpSpPr>
+        <p:cNvPr id="1" name=""/>
+        <p:cNvGrpSpPr/>
+        <p:nvPr/>
+      </p:nvGrpSpPr>
+      <p:grpSpPr>
+        <a:xfrm>
+          <a:off x="0" y="0"/>
+          <a:ext cx="0" cy="0"/>
+          <a:chOff x="0" y="0"/>
+          <a:chExt cx="0" cy="0"/>
+        </a:xfrm>
+      </p:grpSpPr>
+      <p:sp>
+        <p:nvSpPr>
+          <p:cNvPr id="2" name="Slide Image Placeholder 1"/>
+          <p:cNvSpPr>
+            <a:spLocks noGrp="1" noRot="1" noChangeAspect="1"/>
+          </p:cNvSpPr>
+          <p:nvPr>
+            <p:ph type="sldImg"/>
+          </p:nvPr>
+        </p:nvSpPr>
+        <p:spPr/>
+      </p:sp>
+      <p:sp>
+        <p:nvSpPr>
+          <p:cNvPr id="3" name="Notes Placeholder 2"/>
+          <p:cNvSpPr>
+            <a:spLocks noGrp="1"/>
+          </p:cNvSpPr>
+          <p:nvPr>
+            <p:ph type="body" idx="1"/>
+          </p:nvPr>
+        </p:nvSpPr>
+        <p:spPr/>
+        <p:txBody>
+          <a:bodyPr/>
+          <a:lstStyle/>
+          <a:p>
+            <a:pPr algn="just"/>
+            <a:r>
+              <a:rPr lang="en-US" sz="1800">
+                <a:solidFill>
+                  <a:srgbClr val="A31515"/>
+                </a:solidFill>
+                <a:latin typeface="Cascadia Mono" panose="020B0609020000020004" pitchFamily="49" charset="0"/>
+              </a:rPr>
+              <a:t>This text is aligned justified</a:t>
+            </a:r>
+            <a:endParaRPr lang="en-US"/>
+          </a:p>
+        </p:txBody>
+      </p:sp>
+      <p:sp>
+        <p:nvSpPr>
+          <p:cNvPr id="4" name="Slide Number Placeholder 3"/>
+          <p:cNvSpPr>
+            <a:spLocks noGrp="1"/>
+          </p:cNvSpPr>
+          <p:nvPr>
+            <p:ph type="sldNum" sz="quarter" idx="5"/>
+          </p:nvPr>
+        </p:nvSpPr>
+        <p:spPr/>
+        <p:txBody>
+          <a:bodyPr/>
+          <a:lstStyle/>
+          <a:p>
+            <a:fld id="{C50D177A-D6FC-4D39-8CFD-20F2CFDFE6A8}" type="slidenum">
+              <a:rPr lang="en-US" smtClean="0"/>
+              <a:t>6</a:t>
+            </a:fld>
+            <a:endParaRPr lang="en-US"/>
+          </a:p>
+        </p:txBody>
+      </p:sp>
+    </p:spTree>
+    <p:extLst>
+      <p:ext uri="{BB962C8B-B14F-4D97-AF65-F5344CB8AC3E}">
+        <p14:creationId xmlns:p14="http://schemas.microsoft.com/office/powerpoint/2010/main" val="3371983326"/>
+      </p:ext>
+    </p:extLst>
+  </p:cSld>
+  <p:clrMapOvr>
+    <a:masterClrMapping/>
+  </p:clrMapOvr>
+</p:notes>
+</file>
+
 <file path=ppt/slideLayouts/slideLayout1.xml><?xml version="1.0" encoding="utf-8"?>
 <p:sldLayout xmlns:a="http://schemas.openxmlformats.org/drawingml/2006/main" xmlns:r="http://schemas.openxmlformats.org/officeDocument/2006/relationships" xmlns:p="http://schemas.openxmlformats.org/presentationml/2006/main" type="title" preserve="1">
   <p:cSld name="Title Slide">
@@ -803,7 +1176,7 @@
           <a:p>
             <a:fld id="{70F22B0E-A09D-47A1-955C-36AA0FA442C5}" type="datetimeFigureOut">
               <a:rPr lang="en-US" smtClean="0"/>
-              <a:t>3/29/2022</a:t>
+              <a:t>3/30/2022</a:t>
             </a:fld>
             <a:endParaRPr lang="en-US"/>
           </a:p>
@@ -1001,7 +1374,7 @@
           <a:p>
             <a:fld id="{70F22B0E-A09D-47A1-955C-36AA0FA442C5}" type="datetimeFigureOut">
               <a:rPr lang="en-US" smtClean="0"/>
-              <a:t>3/29/2022</a:t>
+              <a:t>3/30/2022</a:t>
             </a:fld>
             <a:endParaRPr lang="en-US"/>
           </a:p>
@@ -1209,7 +1582,7 @@
           <a:p>
             <a:fld id="{70F22B0E-A09D-47A1-955C-36AA0FA442C5}" type="datetimeFigureOut">
               <a:rPr lang="en-US" smtClean="0"/>
-              <a:t>3/29/2022</a:t>
+              <a:t>3/30/2022</a:t>
             </a:fld>
             <a:endParaRPr lang="en-US"/>
           </a:p>
@@ -1407,7 +1780,7 @@
           <a:p>
             <a:fld id="{70F22B0E-A09D-47A1-955C-36AA0FA442C5}" type="datetimeFigureOut">
               <a:rPr lang="en-US" smtClean="0"/>
-              <a:t>3/29/2022</a:t>
+              <a:t>3/30/2022</a:t>
             </a:fld>
             <a:endParaRPr lang="en-US"/>
           </a:p>
@@ -1682,7 +2055,7 @@
           <a:p>
             <a:fld id="{70F22B0E-A09D-47A1-955C-36AA0FA442C5}" type="datetimeFigureOut">
               <a:rPr lang="en-US" smtClean="0"/>
-              <a:t>3/29/2022</a:t>
+              <a:t>3/30/2022</a:t>
             </a:fld>
             <a:endParaRPr lang="en-US"/>
           </a:p>
@@ -1947,7 +2320,7 @@
           <a:p>
             <a:fld id="{70F22B0E-A09D-47A1-955C-36AA0FA442C5}" type="datetimeFigureOut">
               <a:rPr lang="en-US" smtClean="0"/>
-              <a:t>3/29/2022</a:t>
+              <a:t>3/30/2022</a:t>
             </a:fld>
             <a:endParaRPr lang="en-US"/>
           </a:p>
@@ -2359,7 +2732,7 @@
           <a:p>
             <a:fld id="{70F22B0E-A09D-47A1-955C-36AA0FA442C5}" type="datetimeFigureOut">
               <a:rPr lang="en-US" smtClean="0"/>
-              <a:t>3/29/2022</a:t>
+              <a:t>3/30/2022</a:t>
             </a:fld>
             <a:endParaRPr lang="en-US"/>
           </a:p>
@@ -2500,7 +2873,7 @@
           <a:p>
             <a:fld id="{70F22B0E-A09D-47A1-955C-36AA0FA442C5}" type="datetimeFigureOut">
               <a:rPr lang="en-US" smtClean="0"/>
-              <a:t>3/29/2022</a:t>
+              <a:t>3/30/2022</a:t>
             </a:fld>
             <a:endParaRPr lang="en-US"/>
           </a:p>
@@ -2613,7 +2986,7 @@
           <a:p>
             <a:fld id="{70F22B0E-A09D-47A1-955C-36AA0FA442C5}" type="datetimeFigureOut">
               <a:rPr lang="en-US" smtClean="0"/>
-              <a:t>3/29/2022</a:t>
+              <a:t>3/30/2022</a:t>
             </a:fld>
             <a:endParaRPr lang="en-US"/>
           </a:p>
@@ -2924,7 +3297,7 @@
           <a:p>
             <a:fld id="{70F22B0E-A09D-47A1-955C-36AA0FA442C5}" type="datetimeFigureOut">
               <a:rPr lang="en-US" smtClean="0"/>
-              <a:t>3/29/2022</a:t>
+              <a:t>3/30/2022</a:t>
             </a:fld>
             <a:endParaRPr lang="en-US"/>
           </a:p>
@@ -3212,7 +3585,7 @@
           <a:p>
             <a:fld id="{70F22B0E-A09D-47A1-955C-36AA0FA442C5}" type="datetimeFigureOut">
               <a:rPr lang="en-US" smtClean="0"/>
-              <a:t>3/29/2022</a:t>
+              <a:t>3/30/2022</a:t>
             </a:fld>
             <a:endParaRPr lang="en-US"/>
           </a:p>
@@ -3453,7 +3826,7 @@
           <a:p>
             <a:fld id="{70F22B0E-A09D-47A1-955C-36AA0FA442C5}" type="datetimeFigureOut">
               <a:rPr lang="en-US" smtClean="0"/>
-              <a:t>3/29/2022</a:t>
+              <a:t>3/30/2022</a:t>
             </a:fld>
             <a:endParaRPr lang="en-US"/>
           </a:p>
@@ -4004,6 +4377,326 @@
     <p:extLst>
       <p:ext uri="{BB962C8B-B14F-4D97-AF65-F5344CB8AC3E}">
         <p14:creationId xmlns:p14="http://schemas.microsoft.com/office/powerpoint/2010/main" val="4044810432"/>
+      </p:ext>
+    </p:extLst>
+  </p:cSld>
+  <p:clrMapOvr>
+    <a:masterClrMapping/>
+  </p:clrMapOvr>
+</p:sld>
+</file>
+
+<file path=ppt/slides/slide3.xml><?xml version="1.0" encoding="utf-8"?>
+<p:sld xmlns:a="http://schemas.openxmlformats.org/drawingml/2006/main" xmlns:r="http://schemas.openxmlformats.org/officeDocument/2006/relationships" xmlns:p="http://schemas.openxmlformats.org/presentationml/2006/main">
+  <p:cSld>
+    <p:spTree>
+      <p:nvGrpSpPr>
+        <p:cNvPr id="1" name=""/>
+        <p:cNvGrpSpPr/>
+        <p:nvPr/>
+      </p:nvGrpSpPr>
+      <p:grpSpPr>
+        <a:xfrm>
+          <a:off x="0" y="0"/>
+          <a:ext cx="0" cy="0"/>
+          <a:chOff x="0" y="0"/>
+          <a:chExt cx="0" cy="0"/>
+        </a:xfrm>
+      </p:grpSpPr>
+      <p:sp>
+        <p:nvSpPr>
+          <p:cNvPr id="2" name="Title 1">
+            <a:extLst>
+              <a:ext uri="{FF2B5EF4-FFF2-40B4-BE49-F238E27FC236}">
+                <a16:creationId xmlns:a16="http://schemas.microsoft.com/office/drawing/2014/main" id="{8F8F09FE-AC4E-479A-B6EA-E1D27F5AC6EE}"/>
+              </a:ext>
+            </a:extLst>
+          </p:cNvPr>
+          <p:cNvSpPr>
+            <a:spLocks noGrp="1"/>
+          </p:cNvSpPr>
+          <p:nvPr>
+            <p:ph type="title"/>
+          </p:nvPr>
+        </p:nvSpPr>
+        <p:spPr/>
+        <p:txBody>
+          <a:bodyPr/>
+          <a:lstStyle/>
+          <a:p>
+            <a:endParaRPr lang="en-US"/>
+          </a:p>
+        </p:txBody>
+      </p:sp>
+      <p:sp>
+        <p:nvSpPr>
+          <p:cNvPr id="3" name="Content Placeholder 2">
+            <a:extLst>
+              <a:ext uri="{FF2B5EF4-FFF2-40B4-BE49-F238E27FC236}">
+                <a16:creationId xmlns:a16="http://schemas.microsoft.com/office/drawing/2014/main" id="{1BB9C692-FCC3-4265-B65B-E8C9995A7899}"/>
+              </a:ext>
+            </a:extLst>
+          </p:cNvPr>
+          <p:cNvSpPr>
+            <a:spLocks noGrp="1"/>
+          </p:cNvSpPr>
+          <p:nvPr>
+            <p:ph idx="1"/>
+          </p:nvPr>
+        </p:nvSpPr>
+        <p:spPr/>
+        <p:txBody>
+          <a:bodyPr/>
+          <a:lstStyle/>
+          <a:p>
+            <a:endParaRPr lang="en-US"/>
+          </a:p>
+        </p:txBody>
+      </p:sp>
+    </p:spTree>
+    <p:extLst>
+      <p:ext uri="{BB962C8B-B14F-4D97-AF65-F5344CB8AC3E}">
+        <p14:creationId xmlns:p14="http://schemas.microsoft.com/office/powerpoint/2010/main" val="3157759901"/>
+      </p:ext>
+    </p:extLst>
+  </p:cSld>
+  <p:clrMapOvr>
+    <a:masterClrMapping/>
+  </p:clrMapOvr>
+</p:sld>
+</file>
+
+<file path=ppt/slides/slide4.xml><?xml version="1.0" encoding="utf-8"?>
+<p:sld xmlns:a="http://schemas.openxmlformats.org/drawingml/2006/main" xmlns:r="http://schemas.openxmlformats.org/officeDocument/2006/relationships" xmlns:p="http://schemas.openxmlformats.org/presentationml/2006/main">
+  <p:cSld>
+    <p:spTree>
+      <p:nvGrpSpPr>
+        <p:cNvPr id="1" name=""/>
+        <p:cNvGrpSpPr/>
+        <p:nvPr/>
+      </p:nvGrpSpPr>
+      <p:grpSpPr>
+        <a:xfrm>
+          <a:off x="0" y="0"/>
+          <a:ext cx="0" cy="0"/>
+          <a:chOff x="0" y="0"/>
+          <a:chExt cx="0" cy="0"/>
+        </a:xfrm>
+      </p:grpSpPr>
+      <p:sp>
+        <p:nvSpPr>
+          <p:cNvPr id="2" name="Title 1">
+            <a:extLst>
+              <a:ext uri="{FF2B5EF4-FFF2-40B4-BE49-F238E27FC236}">
+                <a16:creationId xmlns:a16="http://schemas.microsoft.com/office/drawing/2014/main" id="{E2C0C05E-FD3E-4A0F-88D7-1EC62C077FD1}"/>
+              </a:ext>
+            </a:extLst>
+          </p:cNvPr>
+          <p:cNvSpPr>
+            <a:spLocks noGrp="1"/>
+          </p:cNvSpPr>
+          <p:nvPr>
+            <p:ph type="title"/>
+          </p:nvPr>
+        </p:nvSpPr>
+        <p:spPr/>
+        <p:txBody>
+          <a:bodyPr/>
+          <a:lstStyle/>
+          <a:p>
+            <a:endParaRPr lang="en-US"/>
+          </a:p>
+        </p:txBody>
+      </p:sp>
+      <p:sp>
+        <p:nvSpPr>
+          <p:cNvPr id="3" name="Content Placeholder 2">
+            <a:extLst>
+              <a:ext uri="{FF2B5EF4-FFF2-40B4-BE49-F238E27FC236}">
+                <a16:creationId xmlns:a16="http://schemas.microsoft.com/office/drawing/2014/main" id="{A43285AD-49F6-4701-B293-CB6FEB568C05}"/>
+              </a:ext>
+            </a:extLst>
+          </p:cNvPr>
+          <p:cNvSpPr>
+            <a:spLocks noGrp="1"/>
+          </p:cNvSpPr>
+          <p:nvPr>
+            <p:ph idx="1"/>
+          </p:nvPr>
+        </p:nvSpPr>
+        <p:spPr/>
+        <p:txBody>
+          <a:bodyPr/>
+          <a:lstStyle/>
+          <a:p>
+            <a:endParaRPr lang="en-US"/>
+          </a:p>
+        </p:txBody>
+      </p:sp>
+    </p:spTree>
+    <p:extLst>
+      <p:ext uri="{BB962C8B-B14F-4D97-AF65-F5344CB8AC3E}">
+        <p14:creationId xmlns:p14="http://schemas.microsoft.com/office/powerpoint/2010/main" val="3333002641"/>
+      </p:ext>
+    </p:extLst>
+  </p:cSld>
+  <p:clrMapOvr>
+    <a:masterClrMapping/>
+  </p:clrMapOvr>
+</p:sld>
+</file>
+
+<file path=ppt/slides/slide5.xml><?xml version="1.0" encoding="utf-8"?>
+<p:sld xmlns:a="http://schemas.openxmlformats.org/drawingml/2006/main" xmlns:r="http://schemas.openxmlformats.org/officeDocument/2006/relationships" xmlns:p="http://schemas.openxmlformats.org/presentationml/2006/main">
+  <p:cSld>
+    <p:spTree>
+      <p:nvGrpSpPr>
+        <p:cNvPr id="1" name=""/>
+        <p:cNvGrpSpPr/>
+        <p:nvPr/>
+      </p:nvGrpSpPr>
+      <p:grpSpPr>
+        <a:xfrm>
+          <a:off x="0" y="0"/>
+          <a:ext cx="0" cy="0"/>
+          <a:chOff x="0" y="0"/>
+          <a:chExt cx="0" cy="0"/>
+        </a:xfrm>
+      </p:grpSpPr>
+      <p:sp>
+        <p:nvSpPr>
+          <p:cNvPr id="2" name="Title 1">
+            <a:extLst>
+              <a:ext uri="{FF2B5EF4-FFF2-40B4-BE49-F238E27FC236}">
+                <a16:creationId xmlns:a16="http://schemas.microsoft.com/office/drawing/2014/main" id="{5B31D305-7DE2-4F59-BE67-746FC3D60D46}"/>
+              </a:ext>
+            </a:extLst>
+          </p:cNvPr>
+          <p:cNvSpPr>
+            <a:spLocks noGrp="1"/>
+          </p:cNvSpPr>
+          <p:nvPr>
+            <p:ph type="title"/>
+          </p:nvPr>
+        </p:nvSpPr>
+        <p:spPr/>
+        <p:txBody>
+          <a:bodyPr/>
+          <a:lstStyle/>
+          <a:p>
+            <a:endParaRPr lang="en-US"/>
+          </a:p>
+        </p:txBody>
+      </p:sp>
+      <p:sp>
+        <p:nvSpPr>
+          <p:cNvPr id="3" name="Content Placeholder 2">
+            <a:extLst>
+              <a:ext uri="{FF2B5EF4-FFF2-40B4-BE49-F238E27FC236}">
+                <a16:creationId xmlns:a16="http://schemas.microsoft.com/office/drawing/2014/main" id="{C345CCA4-7275-4AE1-95E2-2CF16BEA5E5B}"/>
+              </a:ext>
+            </a:extLst>
+          </p:cNvPr>
+          <p:cNvSpPr>
+            <a:spLocks noGrp="1"/>
+          </p:cNvSpPr>
+          <p:nvPr>
+            <p:ph idx="1"/>
+          </p:nvPr>
+        </p:nvSpPr>
+        <p:spPr/>
+        <p:txBody>
+          <a:bodyPr/>
+          <a:lstStyle/>
+          <a:p>
+            <a:endParaRPr lang="en-US"/>
+          </a:p>
+        </p:txBody>
+      </p:sp>
+    </p:spTree>
+    <p:extLst>
+      <p:ext uri="{BB962C8B-B14F-4D97-AF65-F5344CB8AC3E}">
+        <p14:creationId xmlns:p14="http://schemas.microsoft.com/office/powerpoint/2010/main" val="2014503569"/>
+      </p:ext>
+    </p:extLst>
+  </p:cSld>
+  <p:clrMapOvr>
+    <a:masterClrMapping/>
+  </p:clrMapOvr>
+</p:sld>
+</file>
+
+<file path=ppt/slides/slide6.xml><?xml version="1.0" encoding="utf-8"?>
+<p:sld xmlns:a="http://schemas.openxmlformats.org/drawingml/2006/main" xmlns:r="http://schemas.openxmlformats.org/officeDocument/2006/relationships" xmlns:p="http://schemas.openxmlformats.org/presentationml/2006/main">
+  <p:cSld>
+    <p:spTree>
+      <p:nvGrpSpPr>
+        <p:cNvPr id="1" name=""/>
+        <p:cNvGrpSpPr/>
+        <p:nvPr/>
+      </p:nvGrpSpPr>
+      <p:grpSpPr>
+        <a:xfrm>
+          <a:off x="0" y="0"/>
+          <a:ext cx="0" cy="0"/>
+          <a:chOff x="0" y="0"/>
+          <a:chExt cx="0" cy="0"/>
+        </a:xfrm>
+      </p:grpSpPr>
+      <p:sp>
+        <p:nvSpPr>
+          <p:cNvPr id="2" name="Title 1">
+            <a:extLst>
+              <a:ext uri="{FF2B5EF4-FFF2-40B4-BE49-F238E27FC236}">
+                <a16:creationId xmlns:a16="http://schemas.microsoft.com/office/drawing/2014/main" id="{1257A27C-DC1C-4AE0-8BF3-AF4C1BDBF644}"/>
+              </a:ext>
+            </a:extLst>
+          </p:cNvPr>
+          <p:cNvSpPr>
+            <a:spLocks noGrp="1"/>
+          </p:cNvSpPr>
+          <p:nvPr>
+            <p:ph type="title"/>
+          </p:nvPr>
+        </p:nvSpPr>
+        <p:spPr/>
+        <p:txBody>
+          <a:bodyPr/>
+          <a:lstStyle/>
+          <a:p>
+            <a:endParaRPr lang="en-US"/>
+          </a:p>
+        </p:txBody>
+      </p:sp>
+      <p:sp>
+        <p:nvSpPr>
+          <p:cNvPr id="3" name="Content Placeholder 2">
+            <a:extLst>
+              <a:ext uri="{FF2B5EF4-FFF2-40B4-BE49-F238E27FC236}">
+                <a16:creationId xmlns:a16="http://schemas.microsoft.com/office/drawing/2014/main" id="{76DDADA1-C3FF-4174-A84E-FDC605ED5A35}"/>
+              </a:ext>
+            </a:extLst>
+          </p:cNvPr>
+          <p:cNvSpPr>
+            <a:spLocks noGrp="1"/>
+          </p:cNvSpPr>
+          <p:nvPr>
+            <p:ph idx="1"/>
+          </p:nvPr>
+        </p:nvSpPr>
+        <p:spPr/>
+        <p:txBody>
+          <a:bodyPr/>
+          <a:lstStyle/>
+          <a:p>
+            <a:endParaRPr lang="en-US"/>
+          </a:p>
+        </p:txBody>
+      </p:sp>
+    </p:spTree>
+    <p:extLst>
+      <p:ext uri="{BB962C8B-B14F-4D97-AF65-F5344CB8AC3E}">
+        <p14:creationId xmlns:p14="http://schemas.microsoft.com/office/powerpoint/2010/main" val="2925485553"/>
       </p:ext>
     </p:extLst>
   </p:cSld>

</xml_diff>

<commit_message>
added missing unit tests for cases with multiple empty items
</commit_message>
<xml_diff>
--- a/PowerPointParser/PowerPointParserTests/TestData/TestFour.pptx
+++ b/PowerPointParser/PowerPointParserTests/TestData/TestFour.pptx
@@ -5,7 +5,7 @@
     <p:sldMasterId id="2147483648" r:id="rId1"/>
   </p:sldMasterIdLst>
   <p:notesMasterIdLst>
-    <p:notesMasterId r:id="rId8"/>
+    <p:notesMasterId r:id="rId9"/>
   </p:notesMasterIdLst>
   <p:sldIdLst>
     <p:sldId id="256" r:id="rId2"/>
@@ -14,6 +14,7 @@
     <p:sldId id="259" r:id="rId5"/>
     <p:sldId id="260" r:id="rId6"/>
     <p:sldId id="261" r:id="rId7"/>
+    <p:sldId id="262" r:id="rId8"/>
   </p:sldIdLst>
   <p:sldSz cx="12192000" cy="6858000"/>
   <p:notesSz cx="6858000" cy="9144000"/>
@@ -981,7 +982,7 @@
           <a:p>
             <a:pPr algn="just"/>
             <a:r>
-              <a:rPr lang="en-US" sz="1800">
+              <a:rPr lang="en-US" sz="1800" dirty="0">
                 <a:solidFill>
                   <a:srgbClr val="A31515"/>
                 </a:solidFill>
@@ -989,7 +990,7 @@
               </a:rPr>
               <a:t>This text is aligned justified</a:t>
             </a:r>
-            <a:endParaRPr lang="en-US"/>
+            <a:endParaRPr lang="en-US" dirty="0"/>
           </a:p>
         </p:txBody>
       </p:sp>
@@ -1020,6 +1021,145 @@
     <p:extLst>
       <p:ext uri="{BB962C8B-B14F-4D97-AF65-F5344CB8AC3E}">
         <p14:creationId xmlns:p14="http://schemas.microsoft.com/office/powerpoint/2010/main" val="3371983326"/>
+      </p:ext>
+    </p:extLst>
+  </p:cSld>
+  <p:clrMapOvr>
+    <a:masterClrMapping/>
+  </p:clrMapOvr>
+</p:notes>
+</file>
+
+<file path=ppt/notesSlides/notesSlide7.xml><?xml version="1.0" encoding="utf-8"?>
+<p:notes xmlns:a="http://schemas.openxmlformats.org/drawingml/2006/main" xmlns:r="http://schemas.openxmlformats.org/officeDocument/2006/relationships" xmlns:p="http://schemas.openxmlformats.org/presentationml/2006/main">
+  <p:cSld>
+    <p:spTree>
+      <p:nvGrpSpPr>
+        <p:cNvPr id="1" name=""/>
+        <p:cNvGrpSpPr/>
+        <p:nvPr/>
+      </p:nvGrpSpPr>
+      <p:grpSpPr>
+        <a:xfrm>
+          <a:off x="0" y="0"/>
+          <a:ext cx="0" cy="0"/>
+          <a:chOff x="0" y="0"/>
+          <a:chExt cx="0" cy="0"/>
+        </a:xfrm>
+      </p:grpSpPr>
+      <p:sp>
+        <p:nvSpPr>
+          <p:cNvPr id="2" name="Slide Image Placeholder 1"/>
+          <p:cNvSpPr>
+            <a:spLocks noGrp="1" noRot="1" noChangeAspect="1"/>
+          </p:cNvSpPr>
+          <p:nvPr>
+            <p:ph type="sldImg"/>
+          </p:nvPr>
+        </p:nvSpPr>
+        <p:spPr/>
+      </p:sp>
+      <p:sp>
+        <p:nvSpPr>
+          <p:cNvPr id="3" name="Notes Placeholder 2"/>
+          <p:cNvSpPr>
+            <a:spLocks noGrp="1"/>
+          </p:cNvSpPr>
+          <p:nvPr>
+            <p:ph type="body" idx="1"/>
+          </p:nvPr>
+        </p:nvSpPr>
+        <p:spPr/>
+        <p:txBody>
+          <a:bodyPr/>
+          <a:lstStyle/>
+          <a:p>
+            <a:pPr marL="0" indent="0">
+              <a:buFont typeface="+mj-lt"/>
+              <a:buNone/>
+            </a:pPr>
+            <a:r>
+              <a:rPr lang="en-US" dirty="0"/>
+              <a:t>Paragraph One</a:t>
+            </a:r>
+          </a:p>
+          <a:p>
+            <a:pPr marL="0" indent="0">
+              <a:buFont typeface="+mj-lt"/>
+              <a:buNone/>
+            </a:pPr>
+            <a:endParaRPr lang="en-US" dirty="0"/>
+          </a:p>
+          <a:p>
+            <a:pPr marL="0" indent="0">
+              <a:buFont typeface="+mj-lt"/>
+              <a:buNone/>
+            </a:pPr>
+            <a:endParaRPr lang="en-US" dirty="0"/>
+          </a:p>
+          <a:p>
+            <a:pPr marL="0" indent="0">
+              <a:buFont typeface="+mj-lt"/>
+              <a:buNone/>
+            </a:pPr>
+            <a:r>
+              <a:rPr lang="en-US" dirty="0"/>
+              <a:t>Paragraph Two after two spaces</a:t>
+            </a:r>
+          </a:p>
+          <a:p>
+            <a:pPr marL="0" indent="0">
+              <a:buFont typeface="+mj-lt"/>
+              <a:buNone/>
+            </a:pPr>
+            <a:endParaRPr lang="en-US" dirty="0"/>
+          </a:p>
+          <a:p>
+            <a:pPr marL="0" indent="0">
+              <a:buFont typeface="+mj-lt"/>
+              <a:buNone/>
+            </a:pPr>
+            <a:endParaRPr lang="en-US" dirty="0"/>
+          </a:p>
+          <a:p>
+            <a:pPr marL="0" indent="0">
+              <a:buFont typeface="+mj-lt"/>
+              <a:buNone/>
+            </a:pPr>
+            <a:r>
+              <a:rPr lang="en-US" dirty="0"/>
+              <a:t>Paragraph Three after three spaces</a:t>
+            </a:r>
+          </a:p>
+        </p:txBody>
+      </p:sp>
+      <p:sp>
+        <p:nvSpPr>
+          <p:cNvPr id="4" name="Slide Number Placeholder 3"/>
+          <p:cNvSpPr>
+            <a:spLocks noGrp="1"/>
+          </p:cNvSpPr>
+          <p:nvPr>
+            <p:ph type="sldNum" sz="quarter" idx="5"/>
+          </p:nvPr>
+        </p:nvSpPr>
+        <p:spPr/>
+        <p:txBody>
+          <a:bodyPr/>
+          <a:lstStyle/>
+          <a:p>
+            <a:fld id="{C50D177A-D6FC-4D39-8CFD-20F2CFDFE6A8}" type="slidenum">
+              <a:rPr lang="en-US" smtClean="0"/>
+              <a:t>7</a:t>
+            </a:fld>
+            <a:endParaRPr lang="en-US"/>
+          </a:p>
+        </p:txBody>
+      </p:sp>
+    </p:spTree>
+    <p:extLst>
+      <p:ext uri="{BB962C8B-B14F-4D97-AF65-F5344CB8AC3E}">
+        <p14:creationId xmlns:p14="http://schemas.microsoft.com/office/powerpoint/2010/main" val="4141497753"/>
       </p:ext>
     </p:extLst>
   </p:cSld>
@@ -4697,6 +4837,86 @@
     <p:extLst>
       <p:ext uri="{BB962C8B-B14F-4D97-AF65-F5344CB8AC3E}">
         <p14:creationId xmlns:p14="http://schemas.microsoft.com/office/powerpoint/2010/main" val="2925485553"/>
+      </p:ext>
+    </p:extLst>
+  </p:cSld>
+  <p:clrMapOvr>
+    <a:masterClrMapping/>
+  </p:clrMapOvr>
+</p:sld>
+</file>
+
+<file path=ppt/slides/slide7.xml><?xml version="1.0" encoding="utf-8"?>
+<p:sld xmlns:a="http://schemas.openxmlformats.org/drawingml/2006/main" xmlns:r="http://schemas.openxmlformats.org/officeDocument/2006/relationships" xmlns:p="http://schemas.openxmlformats.org/presentationml/2006/main">
+  <p:cSld>
+    <p:spTree>
+      <p:nvGrpSpPr>
+        <p:cNvPr id="1" name=""/>
+        <p:cNvGrpSpPr/>
+        <p:nvPr/>
+      </p:nvGrpSpPr>
+      <p:grpSpPr>
+        <a:xfrm>
+          <a:off x="0" y="0"/>
+          <a:ext cx="0" cy="0"/>
+          <a:chOff x="0" y="0"/>
+          <a:chExt cx="0" cy="0"/>
+        </a:xfrm>
+      </p:grpSpPr>
+      <p:sp>
+        <p:nvSpPr>
+          <p:cNvPr id="2" name="Title 1">
+            <a:extLst>
+              <a:ext uri="{FF2B5EF4-FFF2-40B4-BE49-F238E27FC236}">
+                <a16:creationId xmlns:a16="http://schemas.microsoft.com/office/drawing/2014/main" id="{03D95CA3-275B-4CB5-A44C-99BA6D3C5536}"/>
+              </a:ext>
+            </a:extLst>
+          </p:cNvPr>
+          <p:cNvSpPr>
+            <a:spLocks noGrp="1"/>
+          </p:cNvSpPr>
+          <p:nvPr>
+            <p:ph type="title"/>
+          </p:nvPr>
+        </p:nvSpPr>
+        <p:spPr/>
+        <p:txBody>
+          <a:bodyPr/>
+          <a:lstStyle/>
+          <a:p>
+            <a:endParaRPr lang="en-US"/>
+          </a:p>
+        </p:txBody>
+      </p:sp>
+      <p:sp>
+        <p:nvSpPr>
+          <p:cNvPr id="3" name="Content Placeholder 2">
+            <a:extLst>
+              <a:ext uri="{FF2B5EF4-FFF2-40B4-BE49-F238E27FC236}">
+                <a16:creationId xmlns:a16="http://schemas.microsoft.com/office/drawing/2014/main" id="{0C2D81B9-751C-4B0E-9130-10D21C1E14BF}"/>
+              </a:ext>
+            </a:extLst>
+          </p:cNvPr>
+          <p:cNvSpPr>
+            <a:spLocks noGrp="1"/>
+          </p:cNvSpPr>
+          <p:nvPr>
+            <p:ph idx="1"/>
+          </p:nvPr>
+        </p:nvSpPr>
+        <p:spPr/>
+        <p:txBody>
+          <a:bodyPr/>
+          <a:lstStyle/>
+          <a:p>
+            <a:endParaRPr lang="en-US"/>
+          </a:p>
+        </p:txBody>
+      </p:sp>
+    </p:spTree>
+    <p:extLst>
+      <p:ext uri="{BB962C8B-B14F-4D97-AF65-F5344CB8AC3E}">
+        <p14:creationId xmlns:p14="http://schemas.microsoft.com/office/powerpoint/2010/main" val="2253757326"/>
       </p:ext>
     </p:extLst>
   </p:cSld>

</xml_diff>

<commit_message>
added support for reading non-standards ol and ul li values in parsing and rendered them as standard html counterparts
</commit_message>
<xml_diff>
--- a/PowerPointParser/PowerPointParserTests/TestData/TestFour.pptx
+++ b/PowerPointParser/PowerPointParserTests/TestData/TestFour.pptx
@@ -5,7 +5,7 @@
     <p:sldMasterId id="2147483648" r:id="rId1"/>
   </p:sldMasterIdLst>
   <p:notesMasterIdLst>
-    <p:notesMasterId r:id="rId9"/>
+    <p:notesMasterId r:id="rId21"/>
   </p:notesMasterIdLst>
   <p:sldIdLst>
     <p:sldId id="256" r:id="rId2"/>
@@ -15,6 +15,18 @@
     <p:sldId id="260" r:id="rId6"/>
     <p:sldId id="261" r:id="rId7"/>
     <p:sldId id="262" r:id="rId8"/>
+    <p:sldId id="263" r:id="rId9"/>
+    <p:sldId id="264" r:id="rId10"/>
+    <p:sldId id="265" r:id="rId11"/>
+    <p:sldId id="266" r:id="rId12"/>
+    <p:sldId id="267" r:id="rId13"/>
+    <p:sldId id="268" r:id="rId14"/>
+    <p:sldId id="269" r:id="rId15"/>
+    <p:sldId id="270" r:id="rId16"/>
+    <p:sldId id="271" r:id="rId17"/>
+    <p:sldId id="272" r:id="rId18"/>
+    <p:sldId id="273" r:id="rId19"/>
+    <p:sldId id="274" r:id="rId20"/>
   </p:sldIdLst>
   <p:sldSz cx="12192000" cy="6858000"/>
   <p:notesSz cx="6858000" cy="9144000"/>
@@ -203,7 +215,7 @@
           <a:p>
             <a:fld id="{97505CB1-976E-4E09-9037-91E1052A565F}" type="datetimeFigureOut">
               <a:rPr lang="en-US" smtClean="0"/>
-              <a:t>3/30/2022</a:t>
+              <a:t>3/31/2022</a:t>
             </a:fld>
             <a:endParaRPr lang="en-US"/>
           </a:p>
@@ -574,6 +586,1133 @@
 </p:notes>
 </file>
 
+<file path=ppt/notesSlides/notesSlide10.xml><?xml version="1.0" encoding="utf-8"?>
+<p:notes xmlns:a="http://schemas.openxmlformats.org/drawingml/2006/main" xmlns:r="http://schemas.openxmlformats.org/officeDocument/2006/relationships" xmlns:p="http://schemas.openxmlformats.org/presentationml/2006/main">
+  <p:cSld>
+    <p:spTree>
+      <p:nvGrpSpPr>
+        <p:cNvPr id="1" name=""/>
+        <p:cNvGrpSpPr/>
+        <p:nvPr/>
+      </p:nvGrpSpPr>
+      <p:grpSpPr>
+        <a:xfrm>
+          <a:off x="0" y="0"/>
+          <a:ext cx="0" cy="0"/>
+          <a:chOff x="0" y="0"/>
+          <a:chExt cx="0" cy="0"/>
+        </a:xfrm>
+      </p:grpSpPr>
+      <p:sp>
+        <p:nvSpPr>
+          <p:cNvPr id="2" name="Slide Image Placeholder 1"/>
+          <p:cNvSpPr>
+            <a:spLocks noGrp="1" noRot="1" noChangeAspect="1"/>
+          </p:cNvSpPr>
+          <p:nvPr>
+            <p:ph type="sldImg"/>
+          </p:nvPr>
+        </p:nvSpPr>
+        <p:spPr/>
+      </p:sp>
+      <p:sp>
+        <p:nvSpPr>
+          <p:cNvPr id="3" name="Notes Placeholder 2"/>
+          <p:cNvSpPr>
+            <a:spLocks noGrp="1"/>
+          </p:cNvSpPr>
+          <p:nvPr>
+            <p:ph type="body" idx="1"/>
+          </p:nvPr>
+        </p:nvSpPr>
+        <p:spPr/>
+        <p:txBody>
+          <a:bodyPr/>
+          <a:lstStyle/>
+          <a:p>
+            <a:pPr marL="171450" marR="0" lvl="0" indent="-171450" algn="l" defTabSz="914400" rtl="0" eaLnBrk="1" fontAlgn="auto" latinLnBrk="0" hangingPunct="1">
+              <a:lnSpc>
+                <a:spcPct val="100000"/>
+              </a:lnSpc>
+              <a:spcBef>
+                <a:spcPts val="0"/>
+              </a:spcBef>
+              <a:spcAft>
+                <a:spcPts val="0"/>
+              </a:spcAft>
+              <a:buClrTx/>
+              <a:buSzTx/>
+              <a:buFont typeface="Wingdings" panose="05000000000000000000" pitchFamily="2" charset="2"/>
+              <a:buChar char="q"/>
+              <a:tabLst/>
+              <a:defRPr/>
+            </a:pPr>
+            <a:r>
+              <a:rPr lang="en-US" dirty="0"/>
+              <a:t>Hollow Square Bullets</a:t>
+            </a:r>
+          </a:p>
+          <a:p>
+            <a:pPr marL="171450" indent="-171450">
+              <a:buFont typeface="Wingdings" panose="05000000000000000000" pitchFamily="2" charset="2"/>
+              <a:buChar char="q"/>
+            </a:pPr>
+            <a:r>
+              <a:rPr lang="en-US"/>
+              <a:t>Unordered List</a:t>
+            </a:r>
+          </a:p>
+        </p:txBody>
+      </p:sp>
+      <p:sp>
+        <p:nvSpPr>
+          <p:cNvPr id="4" name="Slide Number Placeholder 3"/>
+          <p:cNvSpPr>
+            <a:spLocks noGrp="1"/>
+          </p:cNvSpPr>
+          <p:nvPr>
+            <p:ph type="sldNum" sz="quarter" idx="5"/>
+          </p:nvPr>
+        </p:nvSpPr>
+        <p:spPr/>
+        <p:txBody>
+          <a:bodyPr/>
+          <a:lstStyle/>
+          <a:p>
+            <a:fld id="{C50D177A-D6FC-4D39-8CFD-20F2CFDFE6A8}" type="slidenum">
+              <a:rPr lang="en-US" smtClean="0"/>
+              <a:t>10</a:t>
+            </a:fld>
+            <a:endParaRPr lang="en-US"/>
+          </a:p>
+        </p:txBody>
+      </p:sp>
+    </p:spTree>
+    <p:extLst>
+      <p:ext uri="{BB962C8B-B14F-4D97-AF65-F5344CB8AC3E}">
+        <p14:creationId xmlns:p14="http://schemas.microsoft.com/office/powerpoint/2010/main" val="426535817"/>
+      </p:ext>
+    </p:extLst>
+  </p:cSld>
+  <p:clrMapOvr>
+    <a:masterClrMapping/>
+  </p:clrMapOvr>
+</p:notes>
+</file>
+
+<file path=ppt/notesSlides/notesSlide11.xml><?xml version="1.0" encoding="utf-8"?>
+<p:notes xmlns:a="http://schemas.openxmlformats.org/drawingml/2006/main" xmlns:r="http://schemas.openxmlformats.org/officeDocument/2006/relationships" xmlns:p="http://schemas.openxmlformats.org/presentationml/2006/main">
+  <p:cSld>
+    <p:spTree>
+      <p:nvGrpSpPr>
+        <p:cNvPr id="1" name=""/>
+        <p:cNvGrpSpPr/>
+        <p:nvPr/>
+      </p:nvGrpSpPr>
+      <p:grpSpPr>
+        <a:xfrm>
+          <a:off x="0" y="0"/>
+          <a:ext cx="0" cy="0"/>
+          <a:chOff x="0" y="0"/>
+          <a:chExt cx="0" cy="0"/>
+        </a:xfrm>
+      </p:grpSpPr>
+      <p:sp>
+        <p:nvSpPr>
+          <p:cNvPr id="2" name="Slide Image Placeholder 1"/>
+          <p:cNvSpPr>
+            <a:spLocks noGrp="1" noRot="1" noChangeAspect="1"/>
+          </p:cNvSpPr>
+          <p:nvPr>
+            <p:ph type="sldImg"/>
+          </p:nvPr>
+        </p:nvSpPr>
+        <p:spPr/>
+      </p:sp>
+      <p:sp>
+        <p:nvSpPr>
+          <p:cNvPr id="3" name="Notes Placeholder 2"/>
+          <p:cNvSpPr>
+            <a:spLocks noGrp="1"/>
+          </p:cNvSpPr>
+          <p:nvPr>
+            <p:ph type="body" idx="1"/>
+          </p:nvPr>
+        </p:nvSpPr>
+        <p:spPr/>
+        <p:txBody>
+          <a:bodyPr/>
+          <a:lstStyle/>
+          <a:p>
+            <a:pPr marL="171450" marR="0" lvl="0" indent="-171450" algn="l" defTabSz="914400" rtl="0" eaLnBrk="1" fontAlgn="auto" latinLnBrk="0" hangingPunct="1">
+              <a:lnSpc>
+                <a:spcPct val="100000"/>
+              </a:lnSpc>
+              <a:spcBef>
+                <a:spcPts val="0"/>
+              </a:spcBef>
+              <a:spcAft>
+                <a:spcPts val="0"/>
+              </a:spcAft>
+              <a:buClrTx/>
+              <a:buSzTx/>
+              <a:buFont typeface="Wingdings" panose="05000000000000000000" pitchFamily="2" charset="2"/>
+              <a:buChar char="v"/>
+              <a:tabLst/>
+              <a:defRPr/>
+            </a:pPr>
+            <a:r>
+              <a:rPr lang="en-US" dirty="0"/>
+              <a:t>Star Bullets</a:t>
+            </a:r>
+          </a:p>
+          <a:p>
+            <a:pPr marL="171450" indent="-171450">
+              <a:buFont typeface="Wingdings" panose="05000000000000000000" pitchFamily="2" charset="2"/>
+              <a:buChar char="v"/>
+            </a:pPr>
+            <a:r>
+              <a:rPr lang="en-US" dirty="0"/>
+              <a:t>Unordered List</a:t>
+            </a:r>
+          </a:p>
+        </p:txBody>
+      </p:sp>
+      <p:sp>
+        <p:nvSpPr>
+          <p:cNvPr id="4" name="Slide Number Placeholder 3"/>
+          <p:cNvSpPr>
+            <a:spLocks noGrp="1"/>
+          </p:cNvSpPr>
+          <p:nvPr>
+            <p:ph type="sldNum" sz="quarter" idx="5"/>
+          </p:nvPr>
+        </p:nvSpPr>
+        <p:spPr/>
+        <p:txBody>
+          <a:bodyPr/>
+          <a:lstStyle/>
+          <a:p>
+            <a:fld id="{C50D177A-D6FC-4D39-8CFD-20F2CFDFE6A8}" type="slidenum">
+              <a:rPr lang="en-US" smtClean="0"/>
+              <a:t>11</a:t>
+            </a:fld>
+            <a:endParaRPr lang="en-US"/>
+          </a:p>
+        </p:txBody>
+      </p:sp>
+    </p:spTree>
+    <p:extLst>
+      <p:ext uri="{BB962C8B-B14F-4D97-AF65-F5344CB8AC3E}">
+        <p14:creationId xmlns:p14="http://schemas.microsoft.com/office/powerpoint/2010/main" val="82499436"/>
+      </p:ext>
+    </p:extLst>
+  </p:cSld>
+  <p:clrMapOvr>
+    <a:masterClrMapping/>
+  </p:clrMapOvr>
+</p:notes>
+</file>
+
+<file path=ppt/notesSlides/notesSlide12.xml><?xml version="1.0" encoding="utf-8"?>
+<p:notes xmlns:a="http://schemas.openxmlformats.org/drawingml/2006/main" xmlns:r="http://schemas.openxmlformats.org/officeDocument/2006/relationships" xmlns:p="http://schemas.openxmlformats.org/presentationml/2006/main">
+  <p:cSld>
+    <p:spTree>
+      <p:nvGrpSpPr>
+        <p:cNvPr id="1" name=""/>
+        <p:cNvGrpSpPr/>
+        <p:nvPr/>
+      </p:nvGrpSpPr>
+      <p:grpSpPr>
+        <a:xfrm>
+          <a:off x="0" y="0"/>
+          <a:ext cx="0" cy="0"/>
+          <a:chOff x="0" y="0"/>
+          <a:chExt cx="0" cy="0"/>
+        </a:xfrm>
+      </p:grpSpPr>
+      <p:sp>
+        <p:nvSpPr>
+          <p:cNvPr id="2" name="Slide Image Placeholder 1"/>
+          <p:cNvSpPr>
+            <a:spLocks noGrp="1" noRot="1" noChangeAspect="1"/>
+          </p:cNvSpPr>
+          <p:nvPr>
+            <p:ph type="sldImg"/>
+          </p:nvPr>
+        </p:nvSpPr>
+        <p:spPr/>
+      </p:sp>
+      <p:sp>
+        <p:nvSpPr>
+          <p:cNvPr id="3" name="Notes Placeholder 2"/>
+          <p:cNvSpPr>
+            <a:spLocks noGrp="1"/>
+          </p:cNvSpPr>
+          <p:nvPr>
+            <p:ph type="body" idx="1"/>
+          </p:nvPr>
+        </p:nvSpPr>
+        <p:spPr/>
+        <p:txBody>
+          <a:bodyPr/>
+          <a:lstStyle/>
+          <a:p>
+            <a:pPr marL="171450" marR="0" lvl="0" indent="-171450" algn="l" defTabSz="914400" rtl="0" eaLnBrk="1" fontAlgn="auto" latinLnBrk="0" hangingPunct="1">
+              <a:lnSpc>
+                <a:spcPct val="100000"/>
+              </a:lnSpc>
+              <a:spcBef>
+                <a:spcPts val="0"/>
+              </a:spcBef>
+              <a:spcAft>
+                <a:spcPts val="0"/>
+              </a:spcAft>
+              <a:buClrTx/>
+              <a:buSzTx/>
+              <a:buFont typeface="Wingdings" panose="05000000000000000000" pitchFamily="2" charset="2"/>
+              <a:buChar char="Ø"/>
+              <a:tabLst/>
+              <a:defRPr/>
+            </a:pPr>
+            <a:r>
+              <a:rPr lang="en-US" dirty="0"/>
+              <a:t>Arrow Bullets</a:t>
+            </a:r>
+          </a:p>
+          <a:p>
+            <a:pPr marL="171450" indent="-171450">
+              <a:buFont typeface="Wingdings" panose="05000000000000000000" pitchFamily="2" charset="2"/>
+              <a:buChar char="Ø"/>
+            </a:pPr>
+            <a:r>
+              <a:rPr lang="en-US" dirty="0"/>
+              <a:t>Unordered List</a:t>
+            </a:r>
+          </a:p>
+        </p:txBody>
+      </p:sp>
+      <p:sp>
+        <p:nvSpPr>
+          <p:cNvPr id="4" name="Slide Number Placeholder 3"/>
+          <p:cNvSpPr>
+            <a:spLocks noGrp="1"/>
+          </p:cNvSpPr>
+          <p:nvPr>
+            <p:ph type="sldNum" sz="quarter" idx="5"/>
+          </p:nvPr>
+        </p:nvSpPr>
+        <p:spPr/>
+        <p:txBody>
+          <a:bodyPr/>
+          <a:lstStyle/>
+          <a:p>
+            <a:fld id="{C50D177A-D6FC-4D39-8CFD-20F2CFDFE6A8}" type="slidenum">
+              <a:rPr lang="en-US" smtClean="0"/>
+              <a:t>12</a:t>
+            </a:fld>
+            <a:endParaRPr lang="en-US"/>
+          </a:p>
+        </p:txBody>
+      </p:sp>
+    </p:spTree>
+    <p:extLst>
+      <p:ext uri="{BB962C8B-B14F-4D97-AF65-F5344CB8AC3E}">
+        <p14:creationId xmlns:p14="http://schemas.microsoft.com/office/powerpoint/2010/main" val="683540095"/>
+      </p:ext>
+    </p:extLst>
+  </p:cSld>
+  <p:clrMapOvr>
+    <a:masterClrMapping/>
+  </p:clrMapOvr>
+</p:notes>
+</file>
+
+<file path=ppt/notesSlides/notesSlide13.xml><?xml version="1.0" encoding="utf-8"?>
+<p:notes xmlns:a="http://schemas.openxmlformats.org/drawingml/2006/main" xmlns:r="http://schemas.openxmlformats.org/officeDocument/2006/relationships" xmlns:p="http://schemas.openxmlformats.org/presentationml/2006/main">
+  <p:cSld>
+    <p:spTree>
+      <p:nvGrpSpPr>
+        <p:cNvPr id="1" name=""/>
+        <p:cNvGrpSpPr/>
+        <p:nvPr/>
+      </p:nvGrpSpPr>
+      <p:grpSpPr>
+        <a:xfrm>
+          <a:off x="0" y="0"/>
+          <a:ext cx="0" cy="0"/>
+          <a:chOff x="0" y="0"/>
+          <a:chExt cx="0" cy="0"/>
+        </a:xfrm>
+      </p:grpSpPr>
+      <p:sp>
+        <p:nvSpPr>
+          <p:cNvPr id="2" name="Slide Image Placeholder 1"/>
+          <p:cNvSpPr>
+            <a:spLocks noGrp="1" noRot="1" noChangeAspect="1"/>
+          </p:cNvSpPr>
+          <p:nvPr>
+            <p:ph type="sldImg"/>
+          </p:nvPr>
+        </p:nvSpPr>
+        <p:spPr/>
+      </p:sp>
+      <p:sp>
+        <p:nvSpPr>
+          <p:cNvPr id="3" name="Notes Placeholder 2"/>
+          <p:cNvSpPr>
+            <a:spLocks noGrp="1"/>
+          </p:cNvSpPr>
+          <p:nvPr>
+            <p:ph type="body" idx="1"/>
+          </p:nvPr>
+        </p:nvSpPr>
+        <p:spPr/>
+        <p:txBody>
+          <a:bodyPr/>
+          <a:lstStyle/>
+          <a:p>
+            <a:pPr marL="171450" marR="0" lvl="0" indent="-171450" algn="l" defTabSz="914400" rtl="0" eaLnBrk="1" fontAlgn="auto" latinLnBrk="0" hangingPunct="1">
+              <a:lnSpc>
+                <a:spcPct val="100000"/>
+              </a:lnSpc>
+              <a:spcBef>
+                <a:spcPts val="0"/>
+              </a:spcBef>
+              <a:spcAft>
+                <a:spcPts val="0"/>
+              </a:spcAft>
+              <a:buClrTx/>
+              <a:buSzTx/>
+              <a:buFont typeface="Wingdings" panose="05000000000000000000" pitchFamily="2" charset="2"/>
+              <a:buChar char="ü"/>
+              <a:tabLst/>
+              <a:defRPr/>
+            </a:pPr>
+            <a:r>
+              <a:rPr lang="en-US" dirty="0"/>
+              <a:t>Checkmark Bullets</a:t>
+            </a:r>
+          </a:p>
+          <a:p>
+            <a:pPr marL="171450" indent="-171450">
+              <a:buFont typeface="Wingdings" panose="05000000000000000000" pitchFamily="2" charset="2"/>
+              <a:buChar char="ü"/>
+            </a:pPr>
+            <a:r>
+              <a:rPr lang="en-US" dirty="0"/>
+              <a:t>Unordered List</a:t>
+            </a:r>
+          </a:p>
+        </p:txBody>
+      </p:sp>
+      <p:sp>
+        <p:nvSpPr>
+          <p:cNvPr id="4" name="Slide Number Placeholder 3"/>
+          <p:cNvSpPr>
+            <a:spLocks noGrp="1"/>
+          </p:cNvSpPr>
+          <p:nvPr>
+            <p:ph type="sldNum" sz="quarter" idx="5"/>
+          </p:nvPr>
+        </p:nvSpPr>
+        <p:spPr/>
+        <p:txBody>
+          <a:bodyPr/>
+          <a:lstStyle/>
+          <a:p>
+            <a:fld id="{C50D177A-D6FC-4D39-8CFD-20F2CFDFE6A8}" type="slidenum">
+              <a:rPr lang="en-US" smtClean="0"/>
+              <a:t>13</a:t>
+            </a:fld>
+            <a:endParaRPr lang="en-US"/>
+          </a:p>
+        </p:txBody>
+      </p:sp>
+    </p:spTree>
+    <p:extLst>
+      <p:ext uri="{BB962C8B-B14F-4D97-AF65-F5344CB8AC3E}">
+        <p14:creationId xmlns:p14="http://schemas.microsoft.com/office/powerpoint/2010/main" val="1911832497"/>
+      </p:ext>
+    </p:extLst>
+  </p:cSld>
+  <p:clrMapOvr>
+    <a:masterClrMapping/>
+  </p:clrMapOvr>
+</p:notes>
+</file>
+
+<file path=ppt/notesSlides/notesSlide14.xml><?xml version="1.0" encoding="utf-8"?>
+<p:notes xmlns:a="http://schemas.openxmlformats.org/drawingml/2006/main" xmlns:r="http://schemas.openxmlformats.org/officeDocument/2006/relationships" xmlns:p="http://schemas.openxmlformats.org/presentationml/2006/main">
+  <p:cSld>
+    <p:spTree>
+      <p:nvGrpSpPr>
+        <p:cNvPr id="1" name=""/>
+        <p:cNvGrpSpPr/>
+        <p:nvPr/>
+      </p:nvGrpSpPr>
+      <p:grpSpPr>
+        <a:xfrm>
+          <a:off x="0" y="0"/>
+          <a:ext cx="0" cy="0"/>
+          <a:chOff x="0" y="0"/>
+          <a:chExt cx="0" cy="0"/>
+        </a:xfrm>
+      </p:grpSpPr>
+      <p:sp>
+        <p:nvSpPr>
+          <p:cNvPr id="2" name="Slide Image Placeholder 1"/>
+          <p:cNvSpPr>
+            <a:spLocks noGrp="1" noRot="1" noChangeAspect="1"/>
+          </p:cNvSpPr>
+          <p:nvPr>
+            <p:ph type="sldImg"/>
+          </p:nvPr>
+        </p:nvSpPr>
+        <p:spPr/>
+      </p:sp>
+      <p:sp>
+        <p:nvSpPr>
+          <p:cNvPr id="3" name="Notes Placeholder 2"/>
+          <p:cNvSpPr>
+            <a:spLocks noGrp="1"/>
+          </p:cNvSpPr>
+          <p:nvPr>
+            <p:ph type="body" idx="1"/>
+          </p:nvPr>
+        </p:nvSpPr>
+        <p:spPr/>
+        <p:txBody>
+          <a:bodyPr/>
+          <a:lstStyle/>
+          <a:p>
+            <a:pPr marL="228600" marR="0" lvl="0" indent="-228600" algn="l" defTabSz="914400" rtl="0" eaLnBrk="1" fontAlgn="auto" latinLnBrk="0" hangingPunct="1">
+              <a:lnSpc>
+                <a:spcPct val="100000"/>
+              </a:lnSpc>
+              <a:spcBef>
+                <a:spcPts val="0"/>
+              </a:spcBef>
+              <a:spcAft>
+                <a:spcPts val="0"/>
+              </a:spcAft>
+              <a:buClrTx/>
+              <a:buSzTx/>
+              <a:buFont typeface="+mj-lt"/>
+              <a:buAutoNum type="arabicParenR"/>
+              <a:tabLst/>
+              <a:defRPr/>
+            </a:pPr>
+            <a:r>
+              <a:rPr lang="en-US" dirty="0"/>
+              <a:t>Open </a:t>
+            </a:r>
+            <a:r>
+              <a:rPr lang="en-US" dirty="0" err="1"/>
+              <a:t>Paren</a:t>
+            </a:r>
+            <a:r>
+              <a:rPr lang="en-US" dirty="0"/>
+              <a:t> Right</a:t>
+            </a:r>
+          </a:p>
+          <a:p>
+            <a:pPr marL="228600" marR="0" lvl="0" indent="-228600" algn="l" defTabSz="914400" rtl="0" eaLnBrk="1" fontAlgn="auto" latinLnBrk="0" hangingPunct="1">
+              <a:lnSpc>
+                <a:spcPct val="100000"/>
+              </a:lnSpc>
+              <a:spcBef>
+                <a:spcPts val="0"/>
+              </a:spcBef>
+              <a:spcAft>
+                <a:spcPts val="0"/>
+              </a:spcAft>
+              <a:buClrTx/>
+              <a:buSzTx/>
+              <a:buFont typeface="+mj-lt"/>
+              <a:buAutoNum type="arabicParenR"/>
+              <a:tabLst/>
+              <a:defRPr/>
+            </a:pPr>
+            <a:r>
+              <a:rPr lang="en-US" dirty="0"/>
+              <a:t>Ordered List</a:t>
+            </a:r>
+          </a:p>
+        </p:txBody>
+      </p:sp>
+      <p:sp>
+        <p:nvSpPr>
+          <p:cNvPr id="4" name="Slide Number Placeholder 3"/>
+          <p:cNvSpPr>
+            <a:spLocks noGrp="1"/>
+          </p:cNvSpPr>
+          <p:nvPr>
+            <p:ph type="sldNum" sz="quarter" idx="5"/>
+          </p:nvPr>
+        </p:nvSpPr>
+        <p:spPr/>
+        <p:txBody>
+          <a:bodyPr/>
+          <a:lstStyle/>
+          <a:p>
+            <a:fld id="{C50D177A-D6FC-4D39-8CFD-20F2CFDFE6A8}" type="slidenum">
+              <a:rPr lang="en-US" smtClean="0"/>
+              <a:t>14</a:t>
+            </a:fld>
+            <a:endParaRPr lang="en-US"/>
+          </a:p>
+        </p:txBody>
+      </p:sp>
+    </p:spTree>
+    <p:extLst>
+      <p:ext uri="{BB962C8B-B14F-4D97-AF65-F5344CB8AC3E}">
+        <p14:creationId xmlns:p14="http://schemas.microsoft.com/office/powerpoint/2010/main" val="515197735"/>
+      </p:ext>
+    </p:extLst>
+  </p:cSld>
+  <p:clrMapOvr>
+    <a:masterClrMapping/>
+  </p:clrMapOvr>
+</p:notes>
+</file>
+
+<file path=ppt/notesSlides/notesSlide15.xml><?xml version="1.0" encoding="utf-8"?>
+<p:notes xmlns:a="http://schemas.openxmlformats.org/drawingml/2006/main" xmlns:r="http://schemas.openxmlformats.org/officeDocument/2006/relationships" xmlns:p="http://schemas.openxmlformats.org/presentationml/2006/main">
+  <p:cSld>
+    <p:spTree>
+      <p:nvGrpSpPr>
+        <p:cNvPr id="1" name=""/>
+        <p:cNvGrpSpPr/>
+        <p:nvPr/>
+      </p:nvGrpSpPr>
+      <p:grpSpPr>
+        <a:xfrm>
+          <a:off x="0" y="0"/>
+          <a:ext cx="0" cy="0"/>
+          <a:chOff x="0" y="0"/>
+          <a:chExt cx="0" cy="0"/>
+        </a:xfrm>
+      </p:grpSpPr>
+      <p:sp>
+        <p:nvSpPr>
+          <p:cNvPr id="2" name="Slide Image Placeholder 1"/>
+          <p:cNvSpPr>
+            <a:spLocks noGrp="1" noRot="1" noChangeAspect="1"/>
+          </p:cNvSpPr>
+          <p:nvPr>
+            <p:ph type="sldImg"/>
+          </p:nvPr>
+        </p:nvSpPr>
+        <p:spPr/>
+      </p:sp>
+      <p:sp>
+        <p:nvSpPr>
+          <p:cNvPr id="3" name="Notes Placeholder 2"/>
+          <p:cNvSpPr>
+            <a:spLocks noGrp="1"/>
+          </p:cNvSpPr>
+          <p:nvPr>
+            <p:ph type="body" idx="1"/>
+          </p:nvPr>
+        </p:nvSpPr>
+        <p:spPr/>
+        <p:txBody>
+          <a:bodyPr/>
+          <a:lstStyle/>
+          <a:p>
+            <a:pPr marL="285750" marR="0" lvl="0" indent="-285750" algn="l" defTabSz="914400" rtl="0" eaLnBrk="1" fontAlgn="auto" latinLnBrk="0" hangingPunct="1">
+              <a:lnSpc>
+                <a:spcPct val="100000"/>
+              </a:lnSpc>
+              <a:spcBef>
+                <a:spcPts val="0"/>
+              </a:spcBef>
+              <a:spcAft>
+                <a:spcPts val="0"/>
+              </a:spcAft>
+              <a:buClrTx/>
+              <a:buSzTx/>
+              <a:buFont typeface="+mj-lt"/>
+              <a:buAutoNum type="romanUcPeriod"/>
+              <a:tabLst/>
+              <a:defRPr/>
+            </a:pPr>
+            <a:r>
+              <a:rPr lang="en-US" dirty="0"/>
+              <a:t>Roman Numerals</a:t>
+            </a:r>
+          </a:p>
+          <a:p>
+            <a:pPr marL="285750" indent="-285750">
+              <a:buFont typeface="+mj-lt"/>
+              <a:buAutoNum type="romanUcPeriod"/>
+            </a:pPr>
+            <a:r>
+              <a:rPr lang="en-US" dirty="0"/>
+              <a:t>Ordered List</a:t>
+            </a:r>
+          </a:p>
+        </p:txBody>
+      </p:sp>
+      <p:sp>
+        <p:nvSpPr>
+          <p:cNvPr id="4" name="Slide Number Placeholder 3"/>
+          <p:cNvSpPr>
+            <a:spLocks noGrp="1"/>
+          </p:cNvSpPr>
+          <p:nvPr>
+            <p:ph type="sldNum" sz="quarter" idx="5"/>
+          </p:nvPr>
+        </p:nvSpPr>
+        <p:spPr/>
+        <p:txBody>
+          <a:bodyPr/>
+          <a:lstStyle/>
+          <a:p>
+            <a:fld id="{C50D177A-D6FC-4D39-8CFD-20F2CFDFE6A8}" type="slidenum">
+              <a:rPr lang="en-US" smtClean="0"/>
+              <a:t>15</a:t>
+            </a:fld>
+            <a:endParaRPr lang="en-US"/>
+          </a:p>
+        </p:txBody>
+      </p:sp>
+    </p:spTree>
+    <p:extLst>
+      <p:ext uri="{BB962C8B-B14F-4D97-AF65-F5344CB8AC3E}">
+        <p14:creationId xmlns:p14="http://schemas.microsoft.com/office/powerpoint/2010/main" val="2684496979"/>
+      </p:ext>
+    </p:extLst>
+  </p:cSld>
+  <p:clrMapOvr>
+    <a:masterClrMapping/>
+  </p:clrMapOvr>
+</p:notes>
+</file>
+
+<file path=ppt/notesSlides/notesSlide16.xml><?xml version="1.0" encoding="utf-8"?>
+<p:notes xmlns:a="http://schemas.openxmlformats.org/drawingml/2006/main" xmlns:r="http://schemas.openxmlformats.org/officeDocument/2006/relationships" xmlns:p="http://schemas.openxmlformats.org/presentationml/2006/main">
+  <p:cSld>
+    <p:spTree>
+      <p:nvGrpSpPr>
+        <p:cNvPr id="1" name=""/>
+        <p:cNvGrpSpPr/>
+        <p:nvPr/>
+      </p:nvGrpSpPr>
+      <p:grpSpPr>
+        <a:xfrm>
+          <a:off x="0" y="0"/>
+          <a:ext cx="0" cy="0"/>
+          <a:chOff x="0" y="0"/>
+          <a:chExt cx="0" cy="0"/>
+        </a:xfrm>
+      </p:grpSpPr>
+      <p:sp>
+        <p:nvSpPr>
+          <p:cNvPr id="2" name="Slide Image Placeholder 1"/>
+          <p:cNvSpPr>
+            <a:spLocks noGrp="1" noRot="1" noChangeAspect="1"/>
+          </p:cNvSpPr>
+          <p:nvPr>
+            <p:ph type="sldImg"/>
+          </p:nvPr>
+        </p:nvSpPr>
+        <p:spPr/>
+      </p:sp>
+      <p:sp>
+        <p:nvSpPr>
+          <p:cNvPr id="3" name="Notes Placeholder 2"/>
+          <p:cNvSpPr>
+            <a:spLocks noGrp="1"/>
+          </p:cNvSpPr>
+          <p:nvPr>
+            <p:ph type="body" idx="1"/>
+          </p:nvPr>
+        </p:nvSpPr>
+        <p:spPr/>
+        <p:txBody>
+          <a:bodyPr/>
+          <a:lstStyle/>
+          <a:p>
+            <a:pPr marL="285750" marR="0" lvl="0" indent="-285750" algn="l" defTabSz="914400" rtl="0" eaLnBrk="1" fontAlgn="auto" latinLnBrk="0" hangingPunct="1">
+              <a:lnSpc>
+                <a:spcPct val="100000"/>
+              </a:lnSpc>
+              <a:spcBef>
+                <a:spcPts val="0"/>
+              </a:spcBef>
+              <a:spcAft>
+                <a:spcPts val="0"/>
+              </a:spcAft>
+              <a:buClrTx/>
+              <a:buSzTx/>
+              <a:buFont typeface="+mj-lt"/>
+              <a:buAutoNum type="alphaUcPeriod"/>
+              <a:tabLst/>
+              <a:defRPr/>
+            </a:pPr>
+            <a:r>
+              <a:rPr lang="en-US" dirty="0"/>
+              <a:t>Capital Letters</a:t>
+            </a:r>
+          </a:p>
+          <a:p>
+            <a:pPr marL="285750" indent="-285750">
+              <a:buFont typeface="+mj-lt"/>
+              <a:buAutoNum type="alphaUcPeriod"/>
+            </a:pPr>
+            <a:r>
+              <a:rPr lang="en-US" dirty="0"/>
+              <a:t>Ordered List</a:t>
+            </a:r>
+          </a:p>
+        </p:txBody>
+      </p:sp>
+      <p:sp>
+        <p:nvSpPr>
+          <p:cNvPr id="4" name="Slide Number Placeholder 3"/>
+          <p:cNvSpPr>
+            <a:spLocks noGrp="1"/>
+          </p:cNvSpPr>
+          <p:nvPr>
+            <p:ph type="sldNum" sz="quarter" idx="5"/>
+          </p:nvPr>
+        </p:nvSpPr>
+        <p:spPr/>
+        <p:txBody>
+          <a:bodyPr/>
+          <a:lstStyle/>
+          <a:p>
+            <a:fld id="{C50D177A-D6FC-4D39-8CFD-20F2CFDFE6A8}" type="slidenum">
+              <a:rPr lang="en-US" smtClean="0"/>
+              <a:t>16</a:t>
+            </a:fld>
+            <a:endParaRPr lang="en-US"/>
+          </a:p>
+        </p:txBody>
+      </p:sp>
+    </p:spTree>
+    <p:extLst>
+      <p:ext uri="{BB962C8B-B14F-4D97-AF65-F5344CB8AC3E}">
+        <p14:creationId xmlns:p14="http://schemas.microsoft.com/office/powerpoint/2010/main" val="638018220"/>
+      </p:ext>
+    </p:extLst>
+  </p:cSld>
+  <p:clrMapOvr>
+    <a:masterClrMapping/>
+  </p:clrMapOvr>
+</p:notes>
+</file>
+
+<file path=ppt/notesSlides/notesSlide17.xml><?xml version="1.0" encoding="utf-8"?>
+<p:notes xmlns:a="http://schemas.openxmlformats.org/drawingml/2006/main" xmlns:r="http://schemas.openxmlformats.org/officeDocument/2006/relationships" xmlns:p="http://schemas.openxmlformats.org/presentationml/2006/main">
+  <p:cSld>
+    <p:spTree>
+      <p:nvGrpSpPr>
+        <p:cNvPr id="1" name=""/>
+        <p:cNvGrpSpPr/>
+        <p:nvPr/>
+      </p:nvGrpSpPr>
+      <p:grpSpPr>
+        <a:xfrm>
+          <a:off x="0" y="0"/>
+          <a:ext cx="0" cy="0"/>
+          <a:chOff x="0" y="0"/>
+          <a:chExt cx="0" cy="0"/>
+        </a:xfrm>
+      </p:grpSpPr>
+      <p:sp>
+        <p:nvSpPr>
+          <p:cNvPr id="2" name="Slide Image Placeholder 1"/>
+          <p:cNvSpPr>
+            <a:spLocks noGrp="1" noRot="1" noChangeAspect="1"/>
+          </p:cNvSpPr>
+          <p:nvPr>
+            <p:ph type="sldImg"/>
+          </p:nvPr>
+        </p:nvSpPr>
+        <p:spPr/>
+      </p:sp>
+      <p:sp>
+        <p:nvSpPr>
+          <p:cNvPr id="3" name="Notes Placeholder 2"/>
+          <p:cNvSpPr>
+            <a:spLocks noGrp="1"/>
+          </p:cNvSpPr>
+          <p:nvPr>
+            <p:ph type="body" idx="1"/>
+          </p:nvPr>
+        </p:nvSpPr>
+        <p:spPr/>
+        <p:txBody>
+          <a:bodyPr/>
+          <a:lstStyle/>
+          <a:p>
+            <a:pPr marL="228600" indent="-228600">
+              <a:buFont typeface="+mj-lt"/>
+              <a:buAutoNum type="alphaLcParenR"/>
+            </a:pPr>
+            <a:r>
+              <a:rPr lang="en-US" dirty="0"/>
+              <a:t>Lowercase Right </a:t>
+            </a:r>
+            <a:r>
+              <a:rPr lang="en-US" dirty="0" err="1"/>
+              <a:t>Paren</a:t>
+            </a:r>
+            <a:endParaRPr lang="en-US" dirty="0"/>
+          </a:p>
+          <a:p>
+            <a:pPr marL="228600" indent="-228600">
+              <a:buFont typeface="+mj-lt"/>
+              <a:buAutoNum type="alphaLcParenR"/>
+            </a:pPr>
+            <a:r>
+              <a:rPr lang="en-US" dirty="0"/>
+              <a:t>Ordered list item</a:t>
+            </a:r>
+          </a:p>
+        </p:txBody>
+      </p:sp>
+      <p:sp>
+        <p:nvSpPr>
+          <p:cNvPr id="4" name="Slide Number Placeholder 3"/>
+          <p:cNvSpPr>
+            <a:spLocks noGrp="1"/>
+          </p:cNvSpPr>
+          <p:nvPr>
+            <p:ph type="sldNum" sz="quarter" idx="5"/>
+          </p:nvPr>
+        </p:nvSpPr>
+        <p:spPr/>
+        <p:txBody>
+          <a:bodyPr/>
+          <a:lstStyle/>
+          <a:p>
+            <a:fld id="{C50D177A-D6FC-4D39-8CFD-20F2CFDFE6A8}" type="slidenum">
+              <a:rPr lang="en-US" smtClean="0"/>
+              <a:t>17</a:t>
+            </a:fld>
+            <a:endParaRPr lang="en-US"/>
+          </a:p>
+        </p:txBody>
+      </p:sp>
+    </p:spTree>
+    <p:extLst>
+      <p:ext uri="{BB962C8B-B14F-4D97-AF65-F5344CB8AC3E}">
+        <p14:creationId xmlns:p14="http://schemas.microsoft.com/office/powerpoint/2010/main" val="3186609175"/>
+      </p:ext>
+    </p:extLst>
+  </p:cSld>
+  <p:clrMapOvr>
+    <a:masterClrMapping/>
+  </p:clrMapOvr>
+</p:notes>
+</file>
+
+<file path=ppt/notesSlides/notesSlide18.xml><?xml version="1.0" encoding="utf-8"?>
+<p:notes xmlns:a="http://schemas.openxmlformats.org/drawingml/2006/main" xmlns:r="http://schemas.openxmlformats.org/officeDocument/2006/relationships" xmlns:p="http://schemas.openxmlformats.org/presentationml/2006/main">
+  <p:cSld>
+    <p:spTree>
+      <p:nvGrpSpPr>
+        <p:cNvPr id="1" name=""/>
+        <p:cNvGrpSpPr/>
+        <p:nvPr/>
+      </p:nvGrpSpPr>
+      <p:grpSpPr>
+        <a:xfrm>
+          <a:off x="0" y="0"/>
+          <a:ext cx="0" cy="0"/>
+          <a:chOff x="0" y="0"/>
+          <a:chExt cx="0" cy="0"/>
+        </a:xfrm>
+      </p:grpSpPr>
+      <p:sp>
+        <p:nvSpPr>
+          <p:cNvPr id="2" name="Slide Image Placeholder 1"/>
+          <p:cNvSpPr>
+            <a:spLocks noGrp="1" noRot="1" noChangeAspect="1"/>
+          </p:cNvSpPr>
+          <p:nvPr>
+            <p:ph type="sldImg"/>
+          </p:nvPr>
+        </p:nvSpPr>
+        <p:spPr/>
+      </p:sp>
+      <p:sp>
+        <p:nvSpPr>
+          <p:cNvPr id="3" name="Notes Placeholder 2"/>
+          <p:cNvSpPr>
+            <a:spLocks noGrp="1"/>
+          </p:cNvSpPr>
+          <p:nvPr>
+            <p:ph type="body" idx="1"/>
+          </p:nvPr>
+        </p:nvSpPr>
+        <p:spPr/>
+        <p:txBody>
+          <a:bodyPr/>
+          <a:lstStyle/>
+          <a:p>
+            <a:pPr marL="228600" indent="-228600">
+              <a:buFont typeface="+mj-lt"/>
+              <a:buAutoNum type="alphaLcPeriod"/>
+            </a:pPr>
+            <a:r>
+              <a:rPr lang="en-US" dirty="0"/>
+              <a:t>Lowercase Period</a:t>
+            </a:r>
+          </a:p>
+          <a:p>
+            <a:pPr marL="228600" indent="-228600">
+              <a:buFont typeface="+mj-lt"/>
+              <a:buAutoNum type="alphaLcPeriod"/>
+            </a:pPr>
+            <a:r>
+              <a:rPr lang="en-US" dirty="0"/>
+              <a:t>Ordered list item</a:t>
+            </a:r>
+          </a:p>
+        </p:txBody>
+      </p:sp>
+      <p:sp>
+        <p:nvSpPr>
+          <p:cNvPr id="4" name="Slide Number Placeholder 3"/>
+          <p:cNvSpPr>
+            <a:spLocks noGrp="1"/>
+          </p:cNvSpPr>
+          <p:nvPr>
+            <p:ph type="sldNum" sz="quarter" idx="5"/>
+          </p:nvPr>
+        </p:nvSpPr>
+        <p:spPr/>
+        <p:txBody>
+          <a:bodyPr/>
+          <a:lstStyle/>
+          <a:p>
+            <a:fld id="{C50D177A-D6FC-4D39-8CFD-20F2CFDFE6A8}" type="slidenum">
+              <a:rPr lang="en-US" smtClean="0"/>
+              <a:t>18</a:t>
+            </a:fld>
+            <a:endParaRPr lang="en-US"/>
+          </a:p>
+        </p:txBody>
+      </p:sp>
+    </p:spTree>
+    <p:extLst>
+      <p:ext uri="{BB962C8B-B14F-4D97-AF65-F5344CB8AC3E}">
+        <p14:creationId xmlns:p14="http://schemas.microsoft.com/office/powerpoint/2010/main" val="751847093"/>
+      </p:ext>
+    </p:extLst>
+  </p:cSld>
+  <p:clrMapOvr>
+    <a:masterClrMapping/>
+  </p:clrMapOvr>
+</p:notes>
+</file>
+
+<file path=ppt/notesSlides/notesSlide19.xml><?xml version="1.0" encoding="utf-8"?>
+<p:notes xmlns:a="http://schemas.openxmlformats.org/drawingml/2006/main" xmlns:r="http://schemas.openxmlformats.org/officeDocument/2006/relationships" xmlns:p="http://schemas.openxmlformats.org/presentationml/2006/main">
+  <p:cSld>
+    <p:spTree>
+      <p:nvGrpSpPr>
+        <p:cNvPr id="1" name=""/>
+        <p:cNvGrpSpPr/>
+        <p:nvPr/>
+      </p:nvGrpSpPr>
+      <p:grpSpPr>
+        <a:xfrm>
+          <a:off x="0" y="0"/>
+          <a:ext cx="0" cy="0"/>
+          <a:chOff x="0" y="0"/>
+          <a:chExt cx="0" cy="0"/>
+        </a:xfrm>
+      </p:grpSpPr>
+      <p:sp>
+        <p:nvSpPr>
+          <p:cNvPr id="2" name="Slide Image Placeholder 1"/>
+          <p:cNvSpPr>
+            <a:spLocks noGrp="1" noRot="1" noChangeAspect="1"/>
+          </p:cNvSpPr>
+          <p:nvPr>
+            <p:ph type="sldImg"/>
+          </p:nvPr>
+        </p:nvSpPr>
+        <p:spPr/>
+      </p:sp>
+      <p:sp>
+        <p:nvSpPr>
+          <p:cNvPr id="3" name="Notes Placeholder 2"/>
+          <p:cNvSpPr>
+            <a:spLocks noGrp="1"/>
+          </p:cNvSpPr>
+          <p:nvPr>
+            <p:ph type="body" idx="1"/>
+          </p:nvPr>
+        </p:nvSpPr>
+        <p:spPr/>
+        <p:txBody>
+          <a:bodyPr/>
+          <a:lstStyle/>
+          <a:p>
+            <a:pPr marL="285750" indent="-285750">
+              <a:buFont typeface="+mj-lt"/>
+              <a:buAutoNum type="romanLcPeriod"/>
+            </a:pPr>
+            <a:r>
+              <a:rPr lang="en-US" dirty="0"/>
+              <a:t>Lowercase Roman Numerals</a:t>
+            </a:r>
+          </a:p>
+          <a:p>
+            <a:pPr marL="285750" indent="-285750">
+              <a:buFont typeface="+mj-lt"/>
+              <a:buAutoNum type="romanLcPeriod"/>
+            </a:pPr>
+            <a:r>
+              <a:rPr lang="en-US" dirty="0"/>
+              <a:t>Ordered list item</a:t>
+            </a:r>
+          </a:p>
+        </p:txBody>
+      </p:sp>
+      <p:sp>
+        <p:nvSpPr>
+          <p:cNvPr id="4" name="Slide Number Placeholder 3"/>
+          <p:cNvSpPr>
+            <a:spLocks noGrp="1"/>
+          </p:cNvSpPr>
+          <p:nvPr>
+            <p:ph type="sldNum" sz="quarter" idx="5"/>
+          </p:nvPr>
+        </p:nvSpPr>
+        <p:spPr/>
+        <p:txBody>
+          <a:bodyPr/>
+          <a:lstStyle/>
+          <a:p>
+            <a:fld id="{C50D177A-D6FC-4D39-8CFD-20F2CFDFE6A8}" type="slidenum">
+              <a:rPr lang="en-US" smtClean="0"/>
+              <a:t>19</a:t>
+            </a:fld>
+            <a:endParaRPr lang="en-US"/>
+          </a:p>
+        </p:txBody>
+      </p:sp>
+    </p:spTree>
+    <p:extLst>
+      <p:ext uri="{BB962C8B-B14F-4D97-AF65-F5344CB8AC3E}">
+        <p14:creationId xmlns:p14="http://schemas.microsoft.com/office/powerpoint/2010/main" val="4208600259"/>
+      </p:ext>
+    </p:extLst>
+  </p:cSld>
+  <p:clrMapOvr>
+    <a:masterClrMapping/>
+  </p:clrMapOvr>
+</p:notes>
+</file>
+
 <file path=ppt/notesSlides/notesSlide2.xml><?xml version="1.0" encoding="utf-8"?>
 <p:notes xmlns:a="http://schemas.openxmlformats.org/drawingml/2006/main" xmlns:r="http://schemas.openxmlformats.org/officeDocument/2006/relationships" xmlns:p="http://schemas.openxmlformats.org/presentationml/2006/main">
   <p:cSld>
@@ -1160,6 +2299,234 @@
     <p:extLst>
       <p:ext uri="{BB962C8B-B14F-4D97-AF65-F5344CB8AC3E}">
         <p14:creationId xmlns:p14="http://schemas.microsoft.com/office/powerpoint/2010/main" val="4141497753"/>
+      </p:ext>
+    </p:extLst>
+  </p:cSld>
+  <p:clrMapOvr>
+    <a:masterClrMapping/>
+  </p:clrMapOvr>
+</p:notes>
+</file>
+
+<file path=ppt/notesSlides/notesSlide8.xml><?xml version="1.0" encoding="utf-8"?>
+<p:notes xmlns:a="http://schemas.openxmlformats.org/drawingml/2006/main" xmlns:r="http://schemas.openxmlformats.org/officeDocument/2006/relationships" xmlns:p="http://schemas.openxmlformats.org/presentationml/2006/main">
+  <p:cSld>
+    <p:spTree>
+      <p:nvGrpSpPr>
+        <p:cNvPr id="1" name=""/>
+        <p:cNvGrpSpPr/>
+        <p:nvPr/>
+      </p:nvGrpSpPr>
+      <p:grpSpPr>
+        <a:xfrm>
+          <a:off x="0" y="0"/>
+          <a:ext cx="0" cy="0"/>
+          <a:chOff x="0" y="0"/>
+          <a:chExt cx="0" cy="0"/>
+        </a:xfrm>
+      </p:grpSpPr>
+      <p:sp>
+        <p:nvSpPr>
+          <p:cNvPr id="2" name="Slide Image Placeholder 1"/>
+          <p:cNvSpPr>
+            <a:spLocks noGrp="1" noRot="1" noChangeAspect="1"/>
+          </p:cNvSpPr>
+          <p:nvPr>
+            <p:ph type="sldImg"/>
+          </p:nvPr>
+        </p:nvSpPr>
+        <p:spPr/>
+      </p:sp>
+      <p:sp>
+        <p:nvSpPr>
+          <p:cNvPr id="3" name="Notes Placeholder 2"/>
+          <p:cNvSpPr>
+            <a:spLocks noGrp="1"/>
+          </p:cNvSpPr>
+          <p:nvPr>
+            <p:ph type="body" idx="1"/>
+          </p:nvPr>
+        </p:nvSpPr>
+        <p:spPr/>
+        <p:txBody>
+          <a:bodyPr/>
+          <a:lstStyle/>
+          <a:p>
+            <a:pPr marL="171450" marR="0" lvl="0" indent="-171450" algn="l" defTabSz="914400" rtl="0" eaLnBrk="1" fontAlgn="auto" latinLnBrk="0" hangingPunct="1">
+              <a:lnSpc>
+                <a:spcPct val="100000"/>
+              </a:lnSpc>
+              <a:spcBef>
+                <a:spcPts val="0"/>
+              </a:spcBef>
+              <a:spcAft>
+                <a:spcPts val="0"/>
+              </a:spcAft>
+              <a:buClrTx/>
+              <a:buSzTx/>
+              <a:buFont typeface="Courier New" panose="02070309020205020404" pitchFamily="49" charset="0"/>
+              <a:buChar char="o"/>
+              <a:tabLst/>
+              <a:defRPr/>
+            </a:pPr>
+            <a:r>
+              <a:rPr lang="en-US" dirty="0"/>
+              <a:t>Hollow Round Bullets</a:t>
+            </a:r>
+          </a:p>
+          <a:p>
+            <a:pPr marL="171450" indent="-171450">
+              <a:buFont typeface="Courier New" panose="02070309020205020404" pitchFamily="49" charset="0"/>
+              <a:buChar char="o"/>
+            </a:pPr>
+            <a:r>
+              <a:rPr lang="en-US" dirty="0"/>
+              <a:t>Unordered List</a:t>
+            </a:r>
+          </a:p>
+        </p:txBody>
+      </p:sp>
+      <p:sp>
+        <p:nvSpPr>
+          <p:cNvPr id="4" name="Slide Number Placeholder 3"/>
+          <p:cNvSpPr>
+            <a:spLocks noGrp="1"/>
+          </p:cNvSpPr>
+          <p:nvPr>
+            <p:ph type="sldNum" sz="quarter" idx="5"/>
+          </p:nvPr>
+        </p:nvSpPr>
+        <p:spPr/>
+        <p:txBody>
+          <a:bodyPr/>
+          <a:lstStyle/>
+          <a:p>
+            <a:fld id="{C50D177A-D6FC-4D39-8CFD-20F2CFDFE6A8}" type="slidenum">
+              <a:rPr lang="en-US" smtClean="0"/>
+              <a:t>8</a:t>
+            </a:fld>
+            <a:endParaRPr lang="en-US"/>
+          </a:p>
+        </p:txBody>
+      </p:sp>
+    </p:spTree>
+    <p:extLst>
+      <p:ext uri="{BB962C8B-B14F-4D97-AF65-F5344CB8AC3E}">
+        <p14:creationId xmlns:p14="http://schemas.microsoft.com/office/powerpoint/2010/main" val="2926000971"/>
+      </p:ext>
+    </p:extLst>
+  </p:cSld>
+  <p:clrMapOvr>
+    <a:masterClrMapping/>
+  </p:clrMapOvr>
+</p:notes>
+</file>
+
+<file path=ppt/notesSlides/notesSlide9.xml><?xml version="1.0" encoding="utf-8"?>
+<p:notes xmlns:a="http://schemas.openxmlformats.org/drawingml/2006/main" xmlns:r="http://schemas.openxmlformats.org/officeDocument/2006/relationships" xmlns:p="http://schemas.openxmlformats.org/presentationml/2006/main">
+  <p:cSld>
+    <p:spTree>
+      <p:nvGrpSpPr>
+        <p:cNvPr id="1" name=""/>
+        <p:cNvGrpSpPr/>
+        <p:nvPr/>
+      </p:nvGrpSpPr>
+      <p:grpSpPr>
+        <a:xfrm>
+          <a:off x="0" y="0"/>
+          <a:ext cx="0" cy="0"/>
+          <a:chOff x="0" y="0"/>
+          <a:chExt cx="0" cy="0"/>
+        </a:xfrm>
+      </p:grpSpPr>
+      <p:sp>
+        <p:nvSpPr>
+          <p:cNvPr id="2" name="Slide Image Placeholder 1"/>
+          <p:cNvSpPr>
+            <a:spLocks noGrp="1" noRot="1" noChangeAspect="1"/>
+          </p:cNvSpPr>
+          <p:nvPr>
+            <p:ph type="sldImg"/>
+          </p:nvPr>
+        </p:nvSpPr>
+        <p:spPr/>
+      </p:sp>
+      <p:sp>
+        <p:nvSpPr>
+          <p:cNvPr id="3" name="Notes Placeholder 2"/>
+          <p:cNvSpPr>
+            <a:spLocks noGrp="1"/>
+          </p:cNvSpPr>
+          <p:nvPr>
+            <p:ph type="body" idx="1"/>
+          </p:nvPr>
+        </p:nvSpPr>
+        <p:spPr/>
+        <p:txBody>
+          <a:bodyPr/>
+          <a:lstStyle/>
+          <a:p>
+            <a:pPr marL="171450" marR="0" lvl="0" indent="-171450" algn="l" defTabSz="914400" rtl="0" eaLnBrk="1" fontAlgn="auto" latinLnBrk="0" hangingPunct="1">
+              <a:lnSpc>
+                <a:spcPct val="100000"/>
+              </a:lnSpc>
+              <a:spcBef>
+                <a:spcPts val="0"/>
+              </a:spcBef>
+              <a:spcAft>
+                <a:spcPts val="0"/>
+              </a:spcAft>
+              <a:buClrTx/>
+              <a:buSzTx/>
+              <a:buFont typeface="Wingdings" panose="05000000000000000000" pitchFamily="2" charset="2"/>
+              <a:buChar char="§"/>
+              <a:tabLst/>
+              <a:defRPr/>
+            </a:pPr>
+            <a:r>
+              <a:rPr lang="en-US" dirty="0"/>
+              <a:t>Filled Square Bullets</a:t>
+            </a:r>
+          </a:p>
+          <a:p>
+            <a:pPr marL="171450" indent="-171450">
+              <a:buFont typeface="Wingdings" panose="05000000000000000000" pitchFamily="2" charset="2"/>
+              <a:buChar char="§"/>
+            </a:pPr>
+            <a:r>
+              <a:rPr lang="en-US" dirty="0"/>
+              <a:t>Unordered List</a:t>
+            </a:r>
+          </a:p>
+        </p:txBody>
+      </p:sp>
+      <p:sp>
+        <p:nvSpPr>
+          <p:cNvPr id="4" name="Slide Number Placeholder 3"/>
+          <p:cNvSpPr>
+            <a:spLocks noGrp="1"/>
+          </p:cNvSpPr>
+          <p:nvPr>
+            <p:ph type="sldNum" sz="quarter" idx="5"/>
+          </p:nvPr>
+        </p:nvSpPr>
+        <p:spPr/>
+        <p:txBody>
+          <a:bodyPr/>
+          <a:lstStyle/>
+          <a:p>
+            <a:fld id="{C50D177A-D6FC-4D39-8CFD-20F2CFDFE6A8}" type="slidenum">
+              <a:rPr lang="en-US" smtClean="0"/>
+              <a:t>9</a:t>
+            </a:fld>
+            <a:endParaRPr lang="en-US"/>
+          </a:p>
+        </p:txBody>
+      </p:sp>
+    </p:spTree>
+    <p:extLst>
+      <p:ext uri="{BB962C8B-B14F-4D97-AF65-F5344CB8AC3E}">
+        <p14:creationId xmlns:p14="http://schemas.microsoft.com/office/powerpoint/2010/main" val="3786090992"/>
       </p:ext>
     </p:extLst>
   </p:cSld>
@@ -1316,7 +2683,7 @@
           <a:p>
             <a:fld id="{70F22B0E-A09D-47A1-955C-36AA0FA442C5}" type="datetimeFigureOut">
               <a:rPr lang="en-US" smtClean="0"/>
-              <a:t>3/30/2022</a:t>
+              <a:t>3/31/2022</a:t>
             </a:fld>
             <a:endParaRPr lang="en-US"/>
           </a:p>
@@ -1514,7 +2881,7 @@
           <a:p>
             <a:fld id="{70F22B0E-A09D-47A1-955C-36AA0FA442C5}" type="datetimeFigureOut">
               <a:rPr lang="en-US" smtClean="0"/>
-              <a:t>3/30/2022</a:t>
+              <a:t>3/31/2022</a:t>
             </a:fld>
             <a:endParaRPr lang="en-US"/>
           </a:p>
@@ -1722,7 +3089,7 @@
           <a:p>
             <a:fld id="{70F22B0E-A09D-47A1-955C-36AA0FA442C5}" type="datetimeFigureOut">
               <a:rPr lang="en-US" smtClean="0"/>
-              <a:t>3/30/2022</a:t>
+              <a:t>3/31/2022</a:t>
             </a:fld>
             <a:endParaRPr lang="en-US"/>
           </a:p>
@@ -1920,7 +3287,7 @@
           <a:p>
             <a:fld id="{70F22B0E-A09D-47A1-955C-36AA0FA442C5}" type="datetimeFigureOut">
               <a:rPr lang="en-US" smtClean="0"/>
-              <a:t>3/30/2022</a:t>
+              <a:t>3/31/2022</a:t>
             </a:fld>
             <a:endParaRPr lang="en-US"/>
           </a:p>
@@ -2195,7 +3562,7 @@
           <a:p>
             <a:fld id="{70F22B0E-A09D-47A1-955C-36AA0FA442C5}" type="datetimeFigureOut">
               <a:rPr lang="en-US" smtClean="0"/>
-              <a:t>3/30/2022</a:t>
+              <a:t>3/31/2022</a:t>
             </a:fld>
             <a:endParaRPr lang="en-US"/>
           </a:p>
@@ -2460,7 +3827,7 @@
           <a:p>
             <a:fld id="{70F22B0E-A09D-47A1-955C-36AA0FA442C5}" type="datetimeFigureOut">
               <a:rPr lang="en-US" smtClean="0"/>
-              <a:t>3/30/2022</a:t>
+              <a:t>3/31/2022</a:t>
             </a:fld>
             <a:endParaRPr lang="en-US"/>
           </a:p>
@@ -2872,7 +4239,7 @@
           <a:p>
             <a:fld id="{70F22B0E-A09D-47A1-955C-36AA0FA442C5}" type="datetimeFigureOut">
               <a:rPr lang="en-US" smtClean="0"/>
-              <a:t>3/30/2022</a:t>
+              <a:t>3/31/2022</a:t>
             </a:fld>
             <a:endParaRPr lang="en-US"/>
           </a:p>
@@ -3013,7 +4380,7 @@
           <a:p>
             <a:fld id="{70F22B0E-A09D-47A1-955C-36AA0FA442C5}" type="datetimeFigureOut">
               <a:rPr lang="en-US" smtClean="0"/>
-              <a:t>3/30/2022</a:t>
+              <a:t>3/31/2022</a:t>
             </a:fld>
             <a:endParaRPr lang="en-US"/>
           </a:p>
@@ -3126,7 +4493,7 @@
           <a:p>
             <a:fld id="{70F22B0E-A09D-47A1-955C-36AA0FA442C5}" type="datetimeFigureOut">
               <a:rPr lang="en-US" smtClean="0"/>
-              <a:t>3/30/2022</a:t>
+              <a:t>3/31/2022</a:t>
             </a:fld>
             <a:endParaRPr lang="en-US"/>
           </a:p>
@@ -3437,7 +4804,7 @@
           <a:p>
             <a:fld id="{70F22B0E-A09D-47A1-955C-36AA0FA442C5}" type="datetimeFigureOut">
               <a:rPr lang="en-US" smtClean="0"/>
-              <a:t>3/30/2022</a:t>
+              <a:t>3/31/2022</a:t>
             </a:fld>
             <a:endParaRPr lang="en-US"/>
           </a:p>
@@ -3725,7 +5092,7 @@
           <a:p>
             <a:fld id="{70F22B0E-A09D-47A1-955C-36AA0FA442C5}" type="datetimeFigureOut">
               <a:rPr lang="en-US" smtClean="0"/>
-              <a:t>3/30/2022</a:t>
+              <a:t>3/31/2022</a:t>
             </a:fld>
             <a:endParaRPr lang="en-US"/>
           </a:p>
@@ -3966,7 +5333,7 @@
           <a:p>
             <a:fld id="{70F22B0E-A09D-47A1-955C-36AA0FA442C5}" type="datetimeFigureOut">
               <a:rPr lang="en-US" smtClean="0"/>
-              <a:t>3/30/2022</a:t>
+              <a:t>3/31/2022</a:t>
             </a:fld>
             <a:endParaRPr lang="en-US"/>
           </a:p>
@@ -4446,6 +5813,806 @@
 </p:sld>
 </file>
 
+<file path=ppt/slides/slide10.xml><?xml version="1.0" encoding="utf-8"?>
+<p:sld xmlns:a="http://schemas.openxmlformats.org/drawingml/2006/main" xmlns:r="http://schemas.openxmlformats.org/officeDocument/2006/relationships" xmlns:p="http://schemas.openxmlformats.org/presentationml/2006/main">
+  <p:cSld>
+    <p:spTree>
+      <p:nvGrpSpPr>
+        <p:cNvPr id="1" name=""/>
+        <p:cNvGrpSpPr/>
+        <p:nvPr/>
+      </p:nvGrpSpPr>
+      <p:grpSpPr>
+        <a:xfrm>
+          <a:off x="0" y="0"/>
+          <a:ext cx="0" cy="0"/>
+          <a:chOff x="0" y="0"/>
+          <a:chExt cx="0" cy="0"/>
+        </a:xfrm>
+      </p:grpSpPr>
+      <p:sp>
+        <p:nvSpPr>
+          <p:cNvPr id="2" name="Title 1">
+            <a:extLst>
+              <a:ext uri="{FF2B5EF4-FFF2-40B4-BE49-F238E27FC236}">
+                <a16:creationId xmlns:a16="http://schemas.microsoft.com/office/drawing/2014/main" id="{F263B4DC-7F75-49B8-AF68-73660C6C143A}"/>
+              </a:ext>
+            </a:extLst>
+          </p:cNvPr>
+          <p:cNvSpPr>
+            <a:spLocks noGrp="1"/>
+          </p:cNvSpPr>
+          <p:nvPr>
+            <p:ph type="ctrTitle"/>
+          </p:nvPr>
+        </p:nvSpPr>
+        <p:spPr/>
+        <p:txBody>
+          <a:bodyPr/>
+          <a:lstStyle/>
+          <a:p>
+            <a:endParaRPr lang="en-US"/>
+          </a:p>
+        </p:txBody>
+      </p:sp>
+      <p:sp>
+        <p:nvSpPr>
+          <p:cNvPr id="3" name="Subtitle 2">
+            <a:extLst>
+              <a:ext uri="{FF2B5EF4-FFF2-40B4-BE49-F238E27FC236}">
+                <a16:creationId xmlns:a16="http://schemas.microsoft.com/office/drawing/2014/main" id="{522EF542-3E77-4900-870C-A8B808599A5D}"/>
+              </a:ext>
+            </a:extLst>
+          </p:cNvPr>
+          <p:cNvSpPr>
+            <a:spLocks noGrp="1"/>
+          </p:cNvSpPr>
+          <p:nvPr>
+            <p:ph type="subTitle" idx="1"/>
+          </p:nvPr>
+        </p:nvSpPr>
+        <p:spPr/>
+        <p:txBody>
+          <a:bodyPr/>
+          <a:lstStyle/>
+          <a:p>
+            <a:endParaRPr lang="en-US"/>
+          </a:p>
+        </p:txBody>
+      </p:sp>
+    </p:spTree>
+    <p:extLst>
+      <p:ext uri="{BB962C8B-B14F-4D97-AF65-F5344CB8AC3E}">
+        <p14:creationId xmlns:p14="http://schemas.microsoft.com/office/powerpoint/2010/main" val="1217400085"/>
+      </p:ext>
+    </p:extLst>
+  </p:cSld>
+  <p:clrMapOvr>
+    <a:masterClrMapping/>
+  </p:clrMapOvr>
+</p:sld>
+</file>
+
+<file path=ppt/slides/slide11.xml><?xml version="1.0" encoding="utf-8"?>
+<p:sld xmlns:a="http://schemas.openxmlformats.org/drawingml/2006/main" xmlns:r="http://schemas.openxmlformats.org/officeDocument/2006/relationships" xmlns:p="http://schemas.openxmlformats.org/presentationml/2006/main">
+  <p:cSld>
+    <p:spTree>
+      <p:nvGrpSpPr>
+        <p:cNvPr id="1" name=""/>
+        <p:cNvGrpSpPr/>
+        <p:nvPr/>
+      </p:nvGrpSpPr>
+      <p:grpSpPr>
+        <a:xfrm>
+          <a:off x="0" y="0"/>
+          <a:ext cx="0" cy="0"/>
+          <a:chOff x="0" y="0"/>
+          <a:chExt cx="0" cy="0"/>
+        </a:xfrm>
+      </p:grpSpPr>
+      <p:sp>
+        <p:nvSpPr>
+          <p:cNvPr id="2" name="Title 1">
+            <a:extLst>
+              <a:ext uri="{FF2B5EF4-FFF2-40B4-BE49-F238E27FC236}">
+                <a16:creationId xmlns:a16="http://schemas.microsoft.com/office/drawing/2014/main" id="{0C46D319-63D4-45DB-B977-CB4770C80805}"/>
+              </a:ext>
+            </a:extLst>
+          </p:cNvPr>
+          <p:cNvSpPr>
+            <a:spLocks noGrp="1"/>
+          </p:cNvSpPr>
+          <p:nvPr>
+            <p:ph type="title"/>
+          </p:nvPr>
+        </p:nvSpPr>
+        <p:spPr/>
+        <p:txBody>
+          <a:bodyPr/>
+          <a:lstStyle/>
+          <a:p>
+            <a:endParaRPr lang="en-US"/>
+          </a:p>
+        </p:txBody>
+      </p:sp>
+      <p:sp>
+        <p:nvSpPr>
+          <p:cNvPr id="3" name="Content Placeholder 2">
+            <a:extLst>
+              <a:ext uri="{FF2B5EF4-FFF2-40B4-BE49-F238E27FC236}">
+                <a16:creationId xmlns:a16="http://schemas.microsoft.com/office/drawing/2014/main" id="{0029398C-B405-4AEE-8847-4409A6A7CF4F}"/>
+              </a:ext>
+            </a:extLst>
+          </p:cNvPr>
+          <p:cNvSpPr>
+            <a:spLocks noGrp="1"/>
+          </p:cNvSpPr>
+          <p:nvPr>
+            <p:ph idx="1"/>
+          </p:nvPr>
+        </p:nvSpPr>
+        <p:spPr/>
+        <p:txBody>
+          <a:bodyPr/>
+          <a:lstStyle/>
+          <a:p>
+            <a:endParaRPr lang="en-US"/>
+          </a:p>
+        </p:txBody>
+      </p:sp>
+    </p:spTree>
+    <p:extLst>
+      <p:ext uri="{BB962C8B-B14F-4D97-AF65-F5344CB8AC3E}">
+        <p14:creationId xmlns:p14="http://schemas.microsoft.com/office/powerpoint/2010/main" val="4273286263"/>
+      </p:ext>
+    </p:extLst>
+  </p:cSld>
+  <p:clrMapOvr>
+    <a:masterClrMapping/>
+  </p:clrMapOvr>
+</p:sld>
+</file>
+
+<file path=ppt/slides/slide12.xml><?xml version="1.0" encoding="utf-8"?>
+<p:sld xmlns:a="http://schemas.openxmlformats.org/drawingml/2006/main" xmlns:r="http://schemas.openxmlformats.org/officeDocument/2006/relationships" xmlns:p="http://schemas.openxmlformats.org/presentationml/2006/main">
+  <p:cSld>
+    <p:spTree>
+      <p:nvGrpSpPr>
+        <p:cNvPr id="1" name=""/>
+        <p:cNvGrpSpPr/>
+        <p:nvPr/>
+      </p:nvGrpSpPr>
+      <p:grpSpPr>
+        <a:xfrm>
+          <a:off x="0" y="0"/>
+          <a:ext cx="0" cy="0"/>
+          <a:chOff x="0" y="0"/>
+          <a:chExt cx="0" cy="0"/>
+        </a:xfrm>
+      </p:grpSpPr>
+      <p:sp>
+        <p:nvSpPr>
+          <p:cNvPr id="2" name="Title 1">
+            <a:extLst>
+              <a:ext uri="{FF2B5EF4-FFF2-40B4-BE49-F238E27FC236}">
+                <a16:creationId xmlns:a16="http://schemas.microsoft.com/office/drawing/2014/main" id="{D477CEA1-1744-42F9-A1D5-4117E1CEB564}"/>
+              </a:ext>
+            </a:extLst>
+          </p:cNvPr>
+          <p:cNvSpPr>
+            <a:spLocks noGrp="1"/>
+          </p:cNvSpPr>
+          <p:nvPr>
+            <p:ph type="title"/>
+          </p:nvPr>
+        </p:nvSpPr>
+        <p:spPr/>
+        <p:txBody>
+          <a:bodyPr/>
+          <a:lstStyle/>
+          <a:p>
+            <a:endParaRPr lang="en-US"/>
+          </a:p>
+        </p:txBody>
+      </p:sp>
+      <p:sp>
+        <p:nvSpPr>
+          <p:cNvPr id="3" name="Content Placeholder 2">
+            <a:extLst>
+              <a:ext uri="{FF2B5EF4-FFF2-40B4-BE49-F238E27FC236}">
+                <a16:creationId xmlns:a16="http://schemas.microsoft.com/office/drawing/2014/main" id="{9ED4F2DA-949B-4A2C-BC8E-CF02EFC27706}"/>
+              </a:ext>
+            </a:extLst>
+          </p:cNvPr>
+          <p:cNvSpPr>
+            <a:spLocks noGrp="1"/>
+          </p:cNvSpPr>
+          <p:nvPr>
+            <p:ph idx="1"/>
+          </p:nvPr>
+        </p:nvSpPr>
+        <p:spPr/>
+        <p:txBody>
+          <a:bodyPr/>
+          <a:lstStyle/>
+          <a:p>
+            <a:endParaRPr lang="en-US"/>
+          </a:p>
+        </p:txBody>
+      </p:sp>
+    </p:spTree>
+    <p:extLst>
+      <p:ext uri="{BB962C8B-B14F-4D97-AF65-F5344CB8AC3E}">
+        <p14:creationId xmlns:p14="http://schemas.microsoft.com/office/powerpoint/2010/main" val="2907991733"/>
+      </p:ext>
+    </p:extLst>
+  </p:cSld>
+  <p:clrMapOvr>
+    <a:masterClrMapping/>
+  </p:clrMapOvr>
+</p:sld>
+</file>
+
+<file path=ppt/slides/slide13.xml><?xml version="1.0" encoding="utf-8"?>
+<p:sld xmlns:a="http://schemas.openxmlformats.org/drawingml/2006/main" xmlns:r="http://schemas.openxmlformats.org/officeDocument/2006/relationships" xmlns:p="http://schemas.openxmlformats.org/presentationml/2006/main">
+  <p:cSld>
+    <p:spTree>
+      <p:nvGrpSpPr>
+        <p:cNvPr id="1" name=""/>
+        <p:cNvGrpSpPr/>
+        <p:nvPr/>
+      </p:nvGrpSpPr>
+      <p:grpSpPr>
+        <a:xfrm>
+          <a:off x="0" y="0"/>
+          <a:ext cx="0" cy="0"/>
+          <a:chOff x="0" y="0"/>
+          <a:chExt cx="0" cy="0"/>
+        </a:xfrm>
+      </p:grpSpPr>
+      <p:sp>
+        <p:nvSpPr>
+          <p:cNvPr id="2" name="Title 1">
+            <a:extLst>
+              <a:ext uri="{FF2B5EF4-FFF2-40B4-BE49-F238E27FC236}">
+                <a16:creationId xmlns:a16="http://schemas.microsoft.com/office/drawing/2014/main" id="{B7BD30E7-1A1A-4BD3-B44B-28362E96D0E2}"/>
+              </a:ext>
+            </a:extLst>
+          </p:cNvPr>
+          <p:cNvSpPr>
+            <a:spLocks noGrp="1"/>
+          </p:cNvSpPr>
+          <p:nvPr>
+            <p:ph type="title"/>
+          </p:nvPr>
+        </p:nvSpPr>
+        <p:spPr/>
+        <p:txBody>
+          <a:bodyPr/>
+          <a:lstStyle/>
+          <a:p>
+            <a:endParaRPr lang="en-US"/>
+          </a:p>
+        </p:txBody>
+      </p:sp>
+      <p:sp>
+        <p:nvSpPr>
+          <p:cNvPr id="3" name="Content Placeholder 2">
+            <a:extLst>
+              <a:ext uri="{FF2B5EF4-FFF2-40B4-BE49-F238E27FC236}">
+                <a16:creationId xmlns:a16="http://schemas.microsoft.com/office/drawing/2014/main" id="{EB7842D9-1DBE-4C3D-BE15-7796F152453D}"/>
+              </a:ext>
+            </a:extLst>
+          </p:cNvPr>
+          <p:cNvSpPr>
+            <a:spLocks noGrp="1"/>
+          </p:cNvSpPr>
+          <p:nvPr>
+            <p:ph idx="1"/>
+          </p:nvPr>
+        </p:nvSpPr>
+        <p:spPr/>
+        <p:txBody>
+          <a:bodyPr/>
+          <a:lstStyle/>
+          <a:p>
+            <a:endParaRPr lang="en-US"/>
+          </a:p>
+        </p:txBody>
+      </p:sp>
+    </p:spTree>
+    <p:extLst>
+      <p:ext uri="{BB962C8B-B14F-4D97-AF65-F5344CB8AC3E}">
+        <p14:creationId xmlns:p14="http://schemas.microsoft.com/office/powerpoint/2010/main" val="3215667032"/>
+      </p:ext>
+    </p:extLst>
+  </p:cSld>
+  <p:clrMapOvr>
+    <a:masterClrMapping/>
+  </p:clrMapOvr>
+</p:sld>
+</file>
+
+<file path=ppt/slides/slide14.xml><?xml version="1.0" encoding="utf-8"?>
+<p:sld xmlns:a="http://schemas.openxmlformats.org/drawingml/2006/main" xmlns:r="http://schemas.openxmlformats.org/officeDocument/2006/relationships" xmlns:p="http://schemas.openxmlformats.org/presentationml/2006/main">
+  <p:cSld>
+    <p:spTree>
+      <p:nvGrpSpPr>
+        <p:cNvPr id="1" name=""/>
+        <p:cNvGrpSpPr/>
+        <p:nvPr/>
+      </p:nvGrpSpPr>
+      <p:grpSpPr>
+        <a:xfrm>
+          <a:off x="0" y="0"/>
+          <a:ext cx="0" cy="0"/>
+          <a:chOff x="0" y="0"/>
+          <a:chExt cx="0" cy="0"/>
+        </a:xfrm>
+      </p:grpSpPr>
+      <p:sp>
+        <p:nvSpPr>
+          <p:cNvPr id="2" name="Title 1">
+            <a:extLst>
+              <a:ext uri="{FF2B5EF4-FFF2-40B4-BE49-F238E27FC236}">
+                <a16:creationId xmlns:a16="http://schemas.microsoft.com/office/drawing/2014/main" id="{8C12E68C-D0AE-49BD-93A5-695DAC99F5C7}"/>
+              </a:ext>
+            </a:extLst>
+          </p:cNvPr>
+          <p:cNvSpPr>
+            <a:spLocks noGrp="1"/>
+          </p:cNvSpPr>
+          <p:nvPr>
+            <p:ph type="title"/>
+          </p:nvPr>
+        </p:nvSpPr>
+        <p:spPr/>
+        <p:txBody>
+          <a:bodyPr/>
+          <a:lstStyle/>
+          <a:p>
+            <a:endParaRPr lang="en-US"/>
+          </a:p>
+        </p:txBody>
+      </p:sp>
+      <p:sp>
+        <p:nvSpPr>
+          <p:cNvPr id="3" name="Content Placeholder 2">
+            <a:extLst>
+              <a:ext uri="{FF2B5EF4-FFF2-40B4-BE49-F238E27FC236}">
+                <a16:creationId xmlns:a16="http://schemas.microsoft.com/office/drawing/2014/main" id="{E97BA97C-FD85-48AD-BCD0-4D9968F0AAD2}"/>
+              </a:ext>
+            </a:extLst>
+          </p:cNvPr>
+          <p:cNvSpPr>
+            <a:spLocks noGrp="1"/>
+          </p:cNvSpPr>
+          <p:nvPr>
+            <p:ph idx="1"/>
+          </p:nvPr>
+        </p:nvSpPr>
+        <p:spPr/>
+        <p:txBody>
+          <a:bodyPr/>
+          <a:lstStyle/>
+          <a:p>
+            <a:endParaRPr lang="en-US"/>
+          </a:p>
+        </p:txBody>
+      </p:sp>
+    </p:spTree>
+    <p:extLst>
+      <p:ext uri="{BB962C8B-B14F-4D97-AF65-F5344CB8AC3E}">
+        <p14:creationId xmlns:p14="http://schemas.microsoft.com/office/powerpoint/2010/main" val="2412581983"/>
+      </p:ext>
+    </p:extLst>
+  </p:cSld>
+  <p:clrMapOvr>
+    <a:masterClrMapping/>
+  </p:clrMapOvr>
+</p:sld>
+</file>
+
+<file path=ppt/slides/slide15.xml><?xml version="1.0" encoding="utf-8"?>
+<p:sld xmlns:a="http://schemas.openxmlformats.org/drawingml/2006/main" xmlns:r="http://schemas.openxmlformats.org/officeDocument/2006/relationships" xmlns:p="http://schemas.openxmlformats.org/presentationml/2006/main">
+  <p:cSld>
+    <p:spTree>
+      <p:nvGrpSpPr>
+        <p:cNvPr id="1" name=""/>
+        <p:cNvGrpSpPr/>
+        <p:nvPr/>
+      </p:nvGrpSpPr>
+      <p:grpSpPr>
+        <a:xfrm>
+          <a:off x="0" y="0"/>
+          <a:ext cx="0" cy="0"/>
+          <a:chOff x="0" y="0"/>
+          <a:chExt cx="0" cy="0"/>
+        </a:xfrm>
+      </p:grpSpPr>
+      <p:sp>
+        <p:nvSpPr>
+          <p:cNvPr id="2" name="Title 1">
+            <a:extLst>
+              <a:ext uri="{FF2B5EF4-FFF2-40B4-BE49-F238E27FC236}">
+                <a16:creationId xmlns:a16="http://schemas.microsoft.com/office/drawing/2014/main" id="{2C1112D3-A00C-49C7-A42B-7C11E040B1C8}"/>
+              </a:ext>
+            </a:extLst>
+          </p:cNvPr>
+          <p:cNvSpPr>
+            <a:spLocks noGrp="1"/>
+          </p:cNvSpPr>
+          <p:nvPr>
+            <p:ph type="title"/>
+          </p:nvPr>
+        </p:nvSpPr>
+        <p:spPr/>
+        <p:txBody>
+          <a:bodyPr/>
+          <a:lstStyle/>
+          <a:p>
+            <a:endParaRPr lang="en-US"/>
+          </a:p>
+        </p:txBody>
+      </p:sp>
+      <p:sp>
+        <p:nvSpPr>
+          <p:cNvPr id="3" name="Content Placeholder 2">
+            <a:extLst>
+              <a:ext uri="{FF2B5EF4-FFF2-40B4-BE49-F238E27FC236}">
+                <a16:creationId xmlns:a16="http://schemas.microsoft.com/office/drawing/2014/main" id="{F10FC99F-4CAD-405C-98F0-CF1E53DCDAC9}"/>
+              </a:ext>
+            </a:extLst>
+          </p:cNvPr>
+          <p:cNvSpPr>
+            <a:spLocks noGrp="1"/>
+          </p:cNvSpPr>
+          <p:nvPr>
+            <p:ph idx="1"/>
+          </p:nvPr>
+        </p:nvSpPr>
+        <p:spPr/>
+        <p:txBody>
+          <a:bodyPr/>
+          <a:lstStyle/>
+          <a:p>
+            <a:endParaRPr lang="en-US"/>
+          </a:p>
+        </p:txBody>
+      </p:sp>
+    </p:spTree>
+    <p:extLst>
+      <p:ext uri="{BB962C8B-B14F-4D97-AF65-F5344CB8AC3E}">
+        <p14:creationId xmlns:p14="http://schemas.microsoft.com/office/powerpoint/2010/main" val="2411554799"/>
+      </p:ext>
+    </p:extLst>
+  </p:cSld>
+  <p:clrMapOvr>
+    <a:masterClrMapping/>
+  </p:clrMapOvr>
+</p:sld>
+</file>
+
+<file path=ppt/slides/slide16.xml><?xml version="1.0" encoding="utf-8"?>
+<p:sld xmlns:a="http://schemas.openxmlformats.org/drawingml/2006/main" xmlns:r="http://schemas.openxmlformats.org/officeDocument/2006/relationships" xmlns:p="http://schemas.openxmlformats.org/presentationml/2006/main">
+  <p:cSld>
+    <p:spTree>
+      <p:nvGrpSpPr>
+        <p:cNvPr id="1" name=""/>
+        <p:cNvGrpSpPr/>
+        <p:nvPr/>
+      </p:nvGrpSpPr>
+      <p:grpSpPr>
+        <a:xfrm>
+          <a:off x="0" y="0"/>
+          <a:ext cx="0" cy="0"/>
+          <a:chOff x="0" y="0"/>
+          <a:chExt cx="0" cy="0"/>
+        </a:xfrm>
+      </p:grpSpPr>
+      <p:sp>
+        <p:nvSpPr>
+          <p:cNvPr id="2" name="Title 1">
+            <a:extLst>
+              <a:ext uri="{FF2B5EF4-FFF2-40B4-BE49-F238E27FC236}">
+                <a16:creationId xmlns:a16="http://schemas.microsoft.com/office/drawing/2014/main" id="{BA6FDF8F-8D6F-4F7F-9449-959A57BD2F6A}"/>
+              </a:ext>
+            </a:extLst>
+          </p:cNvPr>
+          <p:cNvSpPr>
+            <a:spLocks noGrp="1"/>
+          </p:cNvSpPr>
+          <p:nvPr>
+            <p:ph type="title"/>
+          </p:nvPr>
+        </p:nvSpPr>
+        <p:spPr/>
+        <p:txBody>
+          <a:bodyPr/>
+          <a:lstStyle/>
+          <a:p>
+            <a:endParaRPr lang="en-US"/>
+          </a:p>
+        </p:txBody>
+      </p:sp>
+      <p:sp>
+        <p:nvSpPr>
+          <p:cNvPr id="3" name="Content Placeholder 2">
+            <a:extLst>
+              <a:ext uri="{FF2B5EF4-FFF2-40B4-BE49-F238E27FC236}">
+                <a16:creationId xmlns:a16="http://schemas.microsoft.com/office/drawing/2014/main" id="{1A5A7A1E-D019-42A6-BE22-C1C0C7BA3284}"/>
+              </a:ext>
+            </a:extLst>
+          </p:cNvPr>
+          <p:cNvSpPr>
+            <a:spLocks noGrp="1"/>
+          </p:cNvSpPr>
+          <p:nvPr>
+            <p:ph idx="1"/>
+          </p:nvPr>
+        </p:nvSpPr>
+        <p:spPr/>
+        <p:txBody>
+          <a:bodyPr/>
+          <a:lstStyle/>
+          <a:p>
+            <a:endParaRPr lang="en-US"/>
+          </a:p>
+        </p:txBody>
+      </p:sp>
+    </p:spTree>
+    <p:extLst>
+      <p:ext uri="{BB962C8B-B14F-4D97-AF65-F5344CB8AC3E}">
+        <p14:creationId xmlns:p14="http://schemas.microsoft.com/office/powerpoint/2010/main" val="3482755507"/>
+      </p:ext>
+    </p:extLst>
+  </p:cSld>
+  <p:clrMapOvr>
+    <a:masterClrMapping/>
+  </p:clrMapOvr>
+</p:sld>
+</file>
+
+<file path=ppt/slides/slide17.xml><?xml version="1.0" encoding="utf-8"?>
+<p:sld xmlns:a="http://schemas.openxmlformats.org/drawingml/2006/main" xmlns:r="http://schemas.openxmlformats.org/officeDocument/2006/relationships" xmlns:p="http://schemas.openxmlformats.org/presentationml/2006/main">
+  <p:cSld>
+    <p:spTree>
+      <p:nvGrpSpPr>
+        <p:cNvPr id="1" name=""/>
+        <p:cNvGrpSpPr/>
+        <p:nvPr/>
+      </p:nvGrpSpPr>
+      <p:grpSpPr>
+        <a:xfrm>
+          <a:off x="0" y="0"/>
+          <a:ext cx="0" cy="0"/>
+          <a:chOff x="0" y="0"/>
+          <a:chExt cx="0" cy="0"/>
+        </a:xfrm>
+      </p:grpSpPr>
+      <p:sp>
+        <p:nvSpPr>
+          <p:cNvPr id="2" name="Title 1">
+            <a:extLst>
+              <a:ext uri="{FF2B5EF4-FFF2-40B4-BE49-F238E27FC236}">
+                <a16:creationId xmlns:a16="http://schemas.microsoft.com/office/drawing/2014/main" id="{685A59C5-FC36-4AE1-9687-0037D83D6B0A}"/>
+              </a:ext>
+            </a:extLst>
+          </p:cNvPr>
+          <p:cNvSpPr>
+            <a:spLocks noGrp="1"/>
+          </p:cNvSpPr>
+          <p:nvPr>
+            <p:ph type="title"/>
+          </p:nvPr>
+        </p:nvSpPr>
+        <p:spPr/>
+        <p:txBody>
+          <a:bodyPr/>
+          <a:lstStyle/>
+          <a:p>
+            <a:endParaRPr lang="en-US"/>
+          </a:p>
+        </p:txBody>
+      </p:sp>
+      <p:sp>
+        <p:nvSpPr>
+          <p:cNvPr id="3" name="Content Placeholder 2">
+            <a:extLst>
+              <a:ext uri="{FF2B5EF4-FFF2-40B4-BE49-F238E27FC236}">
+                <a16:creationId xmlns:a16="http://schemas.microsoft.com/office/drawing/2014/main" id="{2438FCC2-0158-4F30-8965-C42C665E113F}"/>
+              </a:ext>
+            </a:extLst>
+          </p:cNvPr>
+          <p:cNvSpPr>
+            <a:spLocks noGrp="1"/>
+          </p:cNvSpPr>
+          <p:nvPr>
+            <p:ph idx="1"/>
+          </p:nvPr>
+        </p:nvSpPr>
+        <p:spPr/>
+        <p:txBody>
+          <a:bodyPr/>
+          <a:lstStyle/>
+          <a:p>
+            <a:endParaRPr lang="en-US"/>
+          </a:p>
+        </p:txBody>
+      </p:sp>
+    </p:spTree>
+    <p:extLst>
+      <p:ext uri="{BB962C8B-B14F-4D97-AF65-F5344CB8AC3E}">
+        <p14:creationId xmlns:p14="http://schemas.microsoft.com/office/powerpoint/2010/main" val="2945472215"/>
+      </p:ext>
+    </p:extLst>
+  </p:cSld>
+  <p:clrMapOvr>
+    <a:masterClrMapping/>
+  </p:clrMapOvr>
+</p:sld>
+</file>
+
+<file path=ppt/slides/slide18.xml><?xml version="1.0" encoding="utf-8"?>
+<p:sld xmlns:a="http://schemas.openxmlformats.org/drawingml/2006/main" xmlns:r="http://schemas.openxmlformats.org/officeDocument/2006/relationships" xmlns:p="http://schemas.openxmlformats.org/presentationml/2006/main">
+  <p:cSld>
+    <p:spTree>
+      <p:nvGrpSpPr>
+        <p:cNvPr id="1" name=""/>
+        <p:cNvGrpSpPr/>
+        <p:nvPr/>
+      </p:nvGrpSpPr>
+      <p:grpSpPr>
+        <a:xfrm>
+          <a:off x="0" y="0"/>
+          <a:ext cx="0" cy="0"/>
+          <a:chOff x="0" y="0"/>
+          <a:chExt cx="0" cy="0"/>
+        </a:xfrm>
+      </p:grpSpPr>
+      <p:sp>
+        <p:nvSpPr>
+          <p:cNvPr id="2" name="Title 1">
+            <a:extLst>
+              <a:ext uri="{FF2B5EF4-FFF2-40B4-BE49-F238E27FC236}">
+                <a16:creationId xmlns:a16="http://schemas.microsoft.com/office/drawing/2014/main" id="{22108A50-F857-4DE9-92D5-FD11CDA67E0C}"/>
+              </a:ext>
+            </a:extLst>
+          </p:cNvPr>
+          <p:cNvSpPr>
+            <a:spLocks noGrp="1"/>
+          </p:cNvSpPr>
+          <p:nvPr>
+            <p:ph type="title"/>
+          </p:nvPr>
+        </p:nvSpPr>
+        <p:spPr/>
+        <p:txBody>
+          <a:bodyPr/>
+          <a:lstStyle/>
+          <a:p>
+            <a:endParaRPr lang="en-US"/>
+          </a:p>
+        </p:txBody>
+      </p:sp>
+      <p:sp>
+        <p:nvSpPr>
+          <p:cNvPr id="3" name="Content Placeholder 2">
+            <a:extLst>
+              <a:ext uri="{FF2B5EF4-FFF2-40B4-BE49-F238E27FC236}">
+                <a16:creationId xmlns:a16="http://schemas.microsoft.com/office/drawing/2014/main" id="{B18198AB-6B44-4F6F-A27B-9AB37FAE3AB1}"/>
+              </a:ext>
+            </a:extLst>
+          </p:cNvPr>
+          <p:cNvSpPr>
+            <a:spLocks noGrp="1"/>
+          </p:cNvSpPr>
+          <p:nvPr>
+            <p:ph idx="1"/>
+          </p:nvPr>
+        </p:nvSpPr>
+        <p:spPr/>
+        <p:txBody>
+          <a:bodyPr/>
+          <a:lstStyle/>
+          <a:p>
+            <a:endParaRPr lang="en-US"/>
+          </a:p>
+        </p:txBody>
+      </p:sp>
+    </p:spTree>
+    <p:extLst>
+      <p:ext uri="{BB962C8B-B14F-4D97-AF65-F5344CB8AC3E}">
+        <p14:creationId xmlns:p14="http://schemas.microsoft.com/office/powerpoint/2010/main" val="2429128615"/>
+      </p:ext>
+    </p:extLst>
+  </p:cSld>
+  <p:clrMapOvr>
+    <a:masterClrMapping/>
+  </p:clrMapOvr>
+</p:sld>
+</file>
+
+<file path=ppt/slides/slide19.xml><?xml version="1.0" encoding="utf-8"?>
+<p:sld xmlns:a="http://schemas.openxmlformats.org/drawingml/2006/main" xmlns:r="http://schemas.openxmlformats.org/officeDocument/2006/relationships" xmlns:p="http://schemas.openxmlformats.org/presentationml/2006/main">
+  <p:cSld>
+    <p:spTree>
+      <p:nvGrpSpPr>
+        <p:cNvPr id="1" name=""/>
+        <p:cNvGrpSpPr/>
+        <p:nvPr/>
+      </p:nvGrpSpPr>
+      <p:grpSpPr>
+        <a:xfrm>
+          <a:off x="0" y="0"/>
+          <a:ext cx="0" cy="0"/>
+          <a:chOff x="0" y="0"/>
+          <a:chExt cx="0" cy="0"/>
+        </a:xfrm>
+      </p:grpSpPr>
+      <p:sp>
+        <p:nvSpPr>
+          <p:cNvPr id="2" name="Title 1">
+            <a:extLst>
+              <a:ext uri="{FF2B5EF4-FFF2-40B4-BE49-F238E27FC236}">
+                <a16:creationId xmlns:a16="http://schemas.microsoft.com/office/drawing/2014/main" id="{EEEBEAD8-2800-41F5-82C3-008CD0353D47}"/>
+              </a:ext>
+            </a:extLst>
+          </p:cNvPr>
+          <p:cNvSpPr>
+            <a:spLocks noGrp="1"/>
+          </p:cNvSpPr>
+          <p:nvPr>
+            <p:ph type="title"/>
+          </p:nvPr>
+        </p:nvSpPr>
+        <p:spPr/>
+        <p:txBody>
+          <a:bodyPr/>
+          <a:lstStyle/>
+          <a:p>
+            <a:endParaRPr lang="en-US"/>
+          </a:p>
+        </p:txBody>
+      </p:sp>
+      <p:sp>
+        <p:nvSpPr>
+          <p:cNvPr id="3" name="Content Placeholder 2">
+            <a:extLst>
+              <a:ext uri="{FF2B5EF4-FFF2-40B4-BE49-F238E27FC236}">
+                <a16:creationId xmlns:a16="http://schemas.microsoft.com/office/drawing/2014/main" id="{1DD18BF3-1AE2-42CF-BC5B-C796E4AF532B}"/>
+              </a:ext>
+            </a:extLst>
+          </p:cNvPr>
+          <p:cNvSpPr>
+            <a:spLocks noGrp="1"/>
+          </p:cNvSpPr>
+          <p:nvPr>
+            <p:ph idx="1"/>
+          </p:nvPr>
+        </p:nvSpPr>
+        <p:spPr/>
+        <p:txBody>
+          <a:bodyPr/>
+          <a:lstStyle/>
+          <a:p>
+            <a:endParaRPr lang="en-US"/>
+          </a:p>
+        </p:txBody>
+      </p:sp>
+    </p:spTree>
+    <p:extLst>
+      <p:ext uri="{BB962C8B-B14F-4D97-AF65-F5344CB8AC3E}">
+        <p14:creationId xmlns:p14="http://schemas.microsoft.com/office/powerpoint/2010/main" val="1841802633"/>
+      </p:ext>
+    </p:extLst>
+  </p:cSld>
+  <p:clrMapOvr>
+    <a:masterClrMapping/>
+  </p:clrMapOvr>
+</p:sld>
+</file>
+
 <file path=ppt/slides/slide2.xml><?xml version="1.0" encoding="utf-8"?>
 <p:sld xmlns:a="http://schemas.openxmlformats.org/drawingml/2006/main" xmlns:r="http://schemas.openxmlformats.org/officeDocument/2006/relationships" xmlns:p="http://schemas.openxmlformats.org/presentationml/2006/main">
   <p:cSld>
@@ -4917,6 +7084,166 @@
     <p:extLst>
       <p:ext uri="{BB962C8B-B14F-4D97-AF65-F5344CB8AC3E}">
         <p14:creationId xmlns:p14="http://schemas.microsoft.com/office/powerpoint/2010/main" val="2253757326"/>
+      </p:ext>
+    </p:extLst>
+  </p:cSld>
+  <p:clrMapOvr>
+    <a:masterClrMapping/>
+  </p:clrMapOvr>
+</p:sld>
+</file>
+
+<file path=ppt/slides/slide8.xml><?xml version="1.0" encoding="utf-8"?>
+<p:sld xmlns:a="http://schemas.openxmlformats.org/drawingml/2006/main" xmlns:r="http://schemas.openxmlformats.org/officeDocument/2006/relationships" xmlns:p="http://schemas.openxmlformats.org/presentationml/2006/main">
+  <p:cSld>
+    <p:spTree>
+      <p:nvGrpSpPr>
+        <p:cNvPr id="1" name=""/>
+        <p:cNvGrpSpPr/>
+        <p:nvPr/>
+      </p:nvGrpSpPr>
+      <p:grpSpPr>
+        <a:xfrm>
+          <a:off x="0" y="0"/>
+          <a:ext cx="0" cy="0"/>
+          <a:chOff x="0" y="0"/>
+          <a:chExt cx="0" cy="0"/>
+        </a:xfrm>
+      </p:grpSpPr>
+      <p:sp>
+        <p:nvSpPr>
+          <p:cNvPr id="2" name="Title 1">
+            <a:extLst>
+              <a:ext uri="{FF2B5EF4-FFF2-40B4-BE49-F238E27FC236}">
+                <a16:creationId xmlns:a16="http://schemas.microsoft.com/office/drawing/2014/main" id="{A117468B-A4E1-4134-AAB6-581216400B4D}"/>
+              </a:ext>
+            </a:extLst>
+          </p:cNvPr>
+          <p:cNvSpPr>
+            <a:spLocks noGrp="1"/>
+          </p:cNvSpPr>
+          <p:nvPr>
+            <p:ph type="title"/>
+          </p:nvPr>
+        </p:nvSpPr>
+        <p:spPr/>
+        <p:txBody>
+          <a:bodyPr/>
+          <a:lstStyle/>
+          <a:p>
+            <a:endParaRPr lang="en-US"/>
+          </a:p>
+        </p:txBody>
+      </p:sp>
+      <p:sp>
+        <p:nvSpPr>
+          <p:cNvPr id="3" name="Content Placeholder 2">
+            <a:extLst>
+              <a:ext uri="{FF2B5EF4-FFF2-40B4-BE49-F238E27FC236}">
+                <a16:creationId xmlns:a16="http://schemas.microsoft.com/office/drawing/2014/main" id="{F4CDC5C8-BC49-4C08-8E24-9D93BFD481E5}"/>
+              </a:ext>
+            </a:extLst>
+          </p:cNvPr>
+          <p:cNvSpPr>
+            <a:spLocks noGrp="1"/>
+          </p:cNvSpPr>
+          <p:nvPr>
+            <p:ph idx="1"/>
+          </p:nvPr>
+        </p:nvSpPr>
+        <p:spPr/>
+        <p:txBody>
+          <a:bodyPr/>
+          <a:lstStyle/>
+          <a:p>
+            <a:endParaRPr lang="en-US"/>
+          </a:p>
+        </p:txBody>
+      </p:sp>
+    </p:spTree>
+    <p:extLst>
+      <p:ext uri="{BB962C8B-B14F-4D97-AF65-F5344CB8AC3E}">
+        <p14:creationId xmlns:p14="http://schemas.microsoft.com/office/powerpoint/2010/main" val="2754539225"/>
+      </p:ext>
+    </p:extLst>
+  </p:cSld>
+  <p:clrMapOvr>
+    <a:masterClrMapping/>
+  </p:clrMapOvr>
+</p:sld>
+</file>
+
+<file path=ppt/slides/slide9.xml><?xml version="1.0" encoding="utf-8"?>
+<p:sld xmlns:a="http://schemas.openxmlformats.org/drawingml/2006/main" xmlns:r="http://schemas.openxmlformats.org/officeDocument/2006/relationships" xmlns:p="http://schemas.openxmlformats.org/presentationml/2006/main">
+  <p:cSld>
+    <p:spTree>
+      <p:nvGrpSpPr>
+        <p:cNvPr id="1" name=""/>
+        <p:cNvGrpSpPr/>
+        <p:nvPr/>
+      </p:nvGrpSpPr>
+      <p:grpSpPr>
+        <a:xfrm>
+          <a:off x="0" y="0"/>
+          <a:ext cx="0" cy="0"/>
+          <a:chOff x="0" y="0"/>
+          <a:chExt cx="0" cy="0"/>
+        </a:xfrm>
+      </p:grpSpPr>
+      <p:sp>
+        <p:nvSpPr>
+          <p:cNvPr id="2" name="Title 1">
+            <a:extLst>
+              <a:ext uri="{FF2B5EF4-FFF2-40B4-BE49-F238E27FC236}">
+                <a16:creationId xmlns:a16="http://schemas.microsoft.com/office/drawing/2014/main" id="{0D392EDE-CCC2-4DE7-A94C-C1A7E70E0E85}"/>
+              </a:ext>
+            </a:extLst>
+          </p:cNvPr>
+          <p:cNvSpPr>
+            <a:spLocks noGrp="1"/>
+          </p:cNvSpPr>
+          <p:nvPr>
+            <p:ph type="title"/>
+          </p:nvPr>
+        </p:nvSpPr>
+        <p:spPr/>
+        <p:txBody>
+          <a:bodyPr/>
+          <a:lstStyle/>
+          <a:p>
+            <a:endParaRPr lang="en-US"/>
+          </a:p>
+        </p:txBody>
+      </p:sp>
+      <p:sp>
+        <p:nvSpPr>
+          <p:cNvPr id="3" name="Content Placeholder 2">
+            <a:extLst>
+              <a:ext uri="{FF2B5EF4-FFF2-40B4-BE49-F238E27FC236}">
+                <a16:creationId xmlns:a16="http://schemas.microsoft.com/office/drawing/2014/main" id="{0B403670-E9DD-408E-BD09-4688BA92341A}"/>
+              </a:ext>
+            </a:extLst>
+          </p:cNvPr>
+          <p:cNvSpPr>
+            <a:spLocks noGrp="1"/>
+          </p:cNvSpPr>
+          <p:nvPr>
+            <p:ph idx="1"/>
+          </p:nvPr>
+        </p:nvSpPr>
+        <p:spPr/>
+        <p:txBody>
+          <a:bodyPr/>
+          <a:lstStyle/>
+          <a:p>
+            <a:endParaRPr lang="en-US"/>
+          </a:p>
+        </p:txBody>
+      </p:sp>
+    </p:spTree>
+    <p:extLst>
+      <p:ext uri="{BB962C8B-B14F-4D97-AF65-F5344CB8AC3E}">
+        <p14:creationId xmlns:p14="http://schemas.microsoft.com/office/powerpoint/2010/main" val="363027185"/>
       </p:ext>
     </p:extLst>
   </p:cSld>

</xml_diff>